<commit_message>
se actualizo vista de datos
</commit_message>
<xml_diff>
--- a/ITERACION 4/SUB ITERACION 1/PPT I4S1 v1.pptx
+++ b/ITERACION 4/SUB ITERACION 1/PPT I4S1 v1.pptx
@@ -266,7 +266,7 @@
             <a:pPr>
               <a:defRPr/>
             </a:pPr>
-            <a:fld id="{F620E0FE-86CA-48F3-BC63-A1D739B30730}" type="datetimeFigureOut">
+            <a:fld id="{6E53C902-A770-4766-9030-11F8DBDC6F7F}" type="datetimeFigureOut">
               <a:rPr lang="es-PE"/>
               <a:pPr>
                 <a:defRPr/>
@@ -453,7 +453,7 @@
             <a:pPr>
               <a:defRPr/>
             </a:pPr>
-            <a:fld id="{B6AD17A9-84E5-4211-9606-97F61C9A41E1}" type="slidenum">
+            <a:fld id="{8FF62E9C-D502-4F38-9321-254E83EC52FE}" type="slidenum">
               <a:rPr lang="es-PE"/>
               <a:pPr>
                 <a:defRPr/>
@@ -465,11 +465,6 @@
         </p:txBody>
       </p:sp>
     </p:spTree>
-    <p:extLst>
-      <p:ext uri="{BB962C8B-B14F-4D97-AF65-F5344CB8AC3E}">
-        <p14:creationId xmlns:p14="http://schemas.microsoft.com/office/powerpoint/2010/main" val="3585868644"/>
-      </p:ext>
-    </p:extLst>
   </p:cSld>
   <p:clrMap bg1="lt1" tx1="dk1" bg2="lt2" tx2="dk2" accent1="accent1" accent2="accent2" accent3="accent3" accent4="accent4" accent5="accent5" accent6="accent6" hlink="hlink" folHlink="folHlink"/>
   <p:notesStyle>
@@ -616,7 +611,7 @@
       </p:grpSpPr>
       <p:sp>
         <p:nvSpPr>
-          <p:cNvPr id="2" name="1 Marcador de imagen de diapositiva"/>
+          <p:cNvPr id="19457" name="1 Marcador de imagen de diapositiva"/>
           <p:cNvSpPr>
             <a:spLocks noGrp="1" noRot="1" noChangeAspect="1"/>
           </p:cNvSpPr>
@@ -624,11 +619,21 @@
             <p:ph type="sldImg"/>
           </p:nvPr>
         </p:nvSpPr>
-        <p:spPr/>
+        <p:spPr bwMode="auto">
+          <a:noFill/>
+          <a:ln>
+            <a:solidFill>
+              <a:srgbClr val="000000"/>
+            </a:solidFill>
+            <a:miter lim="800000"/>
+            <a:headEnd/>
+            <a:tailEnd/>
+          </a:ln>
+        </p:spPr>
       </p:sp>
       <p:sp>
         <p:nvSpPr>
-          <p:cNvPr id="3" name="2 Marcador de notas"/>
+          <p:cNvPr id="19458" name="2 Marcador de notas"/>
           <p:cNvSpPr>
             <a:spLocks noGrp="1"/>
           </p:cNvSpPr>
@@ -636,12 +641,18 @@
             <p:ph type="body" idx="1"/>
           </p:nvPr>
         </p:nvSpPr>
-        <p:spPr/>
+        <p:spPr bwMode="auto">
+          <a:noFill/>
+        </p:spPr>
         <p:txBody>
-          <a:bodyPr/>
+          <a:bodyPr wrap="square" numCol="1" anchor="t" anchorCtr="0" compatLnSpc="1">
+            <a:prstTxWarp prst="textNoShape">
+              <a:avLst/>
+            </a:prstTxWarp>
+          </a:bodyPr>
           <a:lstStyle/>
           <a:p>
-            <a:endParaRPr lang="es-PE" dirty="0"/>
+            <a:endParaRPr lang="es-ES" smtClean="0"/>
           </a:p>
         </p:txBody>
       </p:sp>
@@ -652,7 +663,7 @@
             <a:spLocks noGrp="1"/>
           </p:cNvSpPr>
           <p:nvPr>
-            <p:ph type="sldNum" sz="quarter" idx="10"/>
+            <p:ph type="sldNum" sz="quarter" idx="5"/>
           </p:nvPr>
         </p:nvSpPr>
         <p:spPr/>
@@ -663,7 +674,7 @@
             <a:pPr>
               <a:defRPr/>
             </a:pPr>
-            <a:fld id="{B6AD17A9-84E5-4211-9606-97F61C9A41E1}" type="slidenum">
+            <a:fld id="{59C215EB-6145-427D-81A9-0FBFF7813EE4}" type="slidenum">
               <a:rPr lang="es-PE" smtClean="0"/>
               <a:pPr>
                 <a:defRPr/>
@@ -675,11 +686,6 @@
         </p:txBody>
       </p:sp>
     </p:spTree>
-    <p:extLst>
-      <p:ext uri="{BB962C8B-B14F-4D97-AF65-F5344CB8AC3E}">
-        <p14:creationId xmlns:p14="http://schemas.microsoft.com/office/powerpoint/2010/main" val="1271673881"/>
-      </p:ext>
-    </p:extLst>
   </p:cSld>
   <p:clrMapOvr>
     <a:masterClrMapping/>
@@ -706,7 +712,7 @@
       </p:grpSpPr>
       <p:sp>
         <p:nvSpPr>
-          <p:cNvPr id="2" name="1 Marcador de imagen de diapositiva"/>
+          <p:cNvPr id="44033" name="1 Marcador de imagen de diapositiva"/>
           <p:cNvSpPr>
             <a:spLocks noGrp="1" noRot="1" noChangeAspect="1"/>
           </p:cNvSpPr>
@@ -714,11 +720,21 @@
             <p:ph type="sldImg"/>
           </p:nvPr>
         </p:nvSpPr>
-        <p:spPr/>
+        <p:spPr bwMode="auto">
+          <a:noFill/>
+          <a:ln>
+            <a:solidFill>
+              <a:srgbClr val="000000"/>
+            </a:solidFill>
+            <a:miter lim="800000"/>
+            <a:headEnd/>
+            <a:tailEnd/>
+          </a:ln>
+        </p:spPr>
       </p:sp>
       <p:sp>
         <p:nvSpPr>
-          <p:cNvPr id="3" name="2 Marcador de notas"/>
+          <p:cNvPr id="44034" name="2 Marcador de notas"/>
           <p:cNvSpPr>
             <a:spLocks noGrp="1"/>
           </p:cNvSpPr>
@@ -726,12 +742,18 @@
             <p:ph type="body" idx="1"/>
           </p:nvPr>
         </p:nvSpPr>
-        <p:spPr/>
+        <p:spPr bwMode="auto">
+          <a:noFill/>
+        </p:spPr>
         <p:txBody>
-          <a:bodyPr/>
+          <a:bodyPr wrap="square" numCol="1" anchor="t" anchorCtr="0" compatLnSpc="1">
+            <a:prstTxWarp prst="textNoShape">
+              <a:avLst/>
+            </a:prstTxWarp>
+          </a:bodyPr>
           <a:lstStyle/>
           <a:p>
-            <a:endParaRPr lang="es-PE" dirty="0"/>
+            <a:endParaRPr lang="es-ES" smtClean="0"/>
           </a:p>
         </p:txBody>
       </p:sp>
@@ -742,7 +764,7 @@
             <a:spLocks noGrp="1"/>
           </p:cNvSpPr>
           <p:nvPr>
-            <p:ph type="sldNum" sz="quarter" idx="10"/>
+            <p:ph type="sldNum" sz="quarter" idx="5"/>
           </p:nvPr>
         </p:nvSpPr>
         <p:spPr/>
@@ -753,7 +775,7 @@
             <a:pPr>
               <a:defRPr/>
             </a:pPr>
-            <a:fld id="{B6AD17A9-84E5-4211-9606-97F61C9A41E1}" type="slidenum">
+            <a:fld id="{FBCFE57E-7CD8-46E4-BC2D-5BD82A186E6D}" type="slidenum">
               <a:rPr lang="es-PE" smtClean="0"/>
               <a:pPr>
                 <a:defRPr/>
@@ -765,11 +787,6 @@
         </p:txBody>
       </p:sp>
     </p:spTree>
-    <p:extLst>
-      <p:ext uri="{BB962C8B-B14F-4D97-AF65-F5344CB8AC3E}">
-        <p14:creationId xmlns:p14="http://schemas.microsoft.com/office/powerpoint/2010/main" val="1271673881"/>
-      </p:ext>
-    </p:extLst>
   </p:cSld>
   <p:clrMapOvr>
     <a:masterClrMapping/>
@@ -796,7 +813,7 @@
       </p:grpSpPr>
       <p:sp>
         <p:nvSpPr>
-          <p:cNvPr id="2" name="1 Marcador de imagen de diapositiva"/>
+          <p:cNvPr id="46081" name="1 Marcador de imagen de diapositiva"/>
           <p:cNvSpPr>
             <a:spLocks noGrp="1" noRot="1" noChangeAspect="1"/>
           </p:cNvSpPr>
@@ -804,11 +821,21 @@
             <p:ph type="sldImg"/>
           </p:nvPr>
         </p:nvSpPr>
-        <p:spPr/>
+        <p:spPr bwMode="auto">
+          <a:noFill/>
+          <a:ln>
+            <a:solidFill>
+              <a:srgbClr val="000000"/>
+            </a:solidFill>
+            <a:miter lim="800000"/>
+            <a:headEnd/>
+            <a:tailEnd/>
+          </a:ln>
+        </p:spPr>
       </p:sp>
       <p:sp>
         <p:nvSpPr>
-          <p:cNvPr id="3" name="2 Marcador de notas"/>
+          <p:cNvPr id="46082" name="2 Marcador de notas"/>
           <p:cNvSpPr>
             <a:spLocks noGrp="1"/>
           </p:cNvSpPr>
@@ -816,12 +843,18 @@
             <p:ph type="body" idx="1"/>
           </p:nvPr>
         </p:nvSpPr>
-        <p:spPr/>
+        <p:spPr bwMode="auto">
+          <a:noFill/>
+        </p:spPr>
         <p:txBody>
-          <a:bodyPr/>
+          <a:bodyPr wrap="square" numCol="1" anchor="t" anchorCtr="0" compatLnSpc="1">
+            <a:prstTxWarp prst="textNoShape">
+              <a:avLst/>
+            </a:prstTxWarp>
+          </a:bodyPr>
           <a:lstStyle/>
           <a:p>
-            <a:endParaRPr lang="es-PE" dirty="0"/>
+            <a:endParaRPr lang="es-ES" smtClean="0"/>
           </a:p>
         </p:txBody>
       </p:sp>
@@ -832,7 +865,7 @@
             <a:spLocks noGrp="1"/>
           </p:cNvSpPr>
           <p:nvPr>
-            <p:ph type="sldNum" sz="quarter" idx="10"/>
+            <p:ph type="sldNum" sz="quarter" idx="5"/>
           </p:nvPr>
         </p:nvSpPr>
         <p:spPr/>
@@ -843,7 +876,7 @@
             <a:pPr>
               <a:defRPr/>
             </a:pPr>
-            <a:fld id="{B6AD17A9-84E5-4211-9606-97F61C9A41E1}" type="slidenum">
+            <a:fld id="{AB14AF44-AFC7-458C-AB67-333CD9E4C1A0}" type="slidenum">
               <a:rPr lang="es-PE" smtClean="0"/>
               <a:pPr>
                 <a:defRPr/>
@@ -855,11 +888,6 @@
         </p:txBody>
       </p:sp>
     </p:spTree>
-    <p:extLst>
-      <p:ext uri="{BB962C8B-B14F-4D97-AF65-F5344CB8AC3E}">
-        <p14:creationId xmlns:p14="http://schemas.microsoft.com/office/powerpoint/2010/main" val="1271673881"/>
-      </p:ext>
-    </p:extLst>
   </p:cSld>
   <p:clrMapOvr>
     <a:masterClrMapping/>
@@ -886,7 +914,7 @@
       </p:grpSpPr>
       <p:sp>
         <p:nvSpPr>
-          <p:cNvPr id="2" name="1 Marcador de imagen de diapositiva"/>
+          <p:cNvPr id="49153" name="1 Marcador de imagen de diapositiva"/>
           <p:cNvSpPr>
             <a:spLocks noGrp="1" noRot="1" noChangeAspect="1"/>
           </p:cNvSpPr>
@@ -894,11 +922,21 @@
             <p:ph type="sldImg"/>
           </p:nvPr>
         </p:nvSpPr>
-        <p:spPr/>
+        <p:spPr bwMode="auto">
+          <a:noFill/>
+          <a:ln>
+            <a:solidFill>
+              <a:srgbClr val="000000"/>
+            </a:solidFill>
+            <a:miter lim="800000"/>
+            <a:headEnd/>
+            <a:tailEnd/>
+          </a:ln>
+        </p:spPr>
       </p:sp>
       <p:sp>
         <p:nvSpPr>
-          <p:cNvPr id="3" name="2 Marcador de notas"/>
+          <p:cNvPr id="49154" name="2 Marcador de notas"/>
           <p:cNvSpPr>
             <a:spLocks noGrp="1"/>
           </p:cNvSpPr>
@@ -906,12 +944,18 @@
             <p:ph type="body" idx="1"/>
           </p:nvPr>
         </p:nvSpPr>
-        <p:spPr/>
+        <p:spPr bwMode="auto">
+          <a:noFill/>
+        </p:spPr>
         <p:txBody>
-          <a:bodyPr/>
+          <a:bodyPr wrap="square" numCol="1" anchor="t" anchorCtr="0" compatLnSpc="1">
+            <a:prstTxWarp prst="textNoShape">
+              <a:avLst/>
+            </a:prstTxWarp>
+          </a:bodyPr>
           <a:lstStyle/>
           <a:p>
-            <a:endParaRPr lang="es-PE" dirty="0"/>
+            <a:endParaRPr lang="es-ES" smtClean="0"/>
           </a:p>
         </p:txBody>
       </p:sp>
@@ -922,7 +966,7 @@
             <a:spLocks noGrp="1"/>
           </p:cNvSpPr>
           <p:nvPr>
-            <p:ph type="sldNum" sz="quarter" idx="10"/>
+            <p:ph type="sldNum" sz="quarter" idx="5"/>
           </p:nvPr>
         </p:nvSpPr>
         <p:spPr/>
@@ -933,7 +977,7 @@
             <a:pPr>
               <a:defRPr/>
             </a:pPr>
-            <a:fld id="{B6AD17A9-84E5-4211-9606-97F61C9A41E1}" type="slidenum">
+            <a:fld id="{2ACBA147-A8C1-4BAE-BCFD-E8B7FAB602F1}" type="slidenum">
               <a:rPr lang="es-PE" smtClean="0"/>
               <a:pPr>
                 <a:defRPr/>
@@ -945,11 +989,6 @@
         </p:txBody>
       </p:sp>
     </p:spTree>
-    <p:extLst>
-      <p:ext uri="{BB962C8B-B14F-4D97-AF65-F5344CB8AC3E}">
-        <p14:creationId xmlns:p14="http://schemas.microsoft.com/office/powerpoint/2010/main" val="1271673881"/>
-      </p:ext>
-    </p:extLst>
   </p:cSld>
   <p:clrMapOvr>
     <a:masterClrMapping/>
@@ -976,7 +1015,7 @@
       </p:grpSpPr>
       <p:sp>
         <p:nvSpPr>
-          <p:cNvPr id="2" name="1 Marcador de imagen de diapositiva"/>
+          <p:cNvPr id="52225" name="1 Marcador de imagen de diapositiva"/>
           <p:cNvSpPr>
             <a:spLocks noGrp="1" noRot="1" noChangeAspect="1"/>
           </p:cNvSpPr>
@@ -984,11 +1023,21 @@
             <p:ph type="sldImg"/>
           </p:nvPr>
         </p:nvSpPr>
-        <p:spPr/>
+        <p:spPr bwMode="auto">
+          <a:noFill/>
+          <a:ln>
+            <a:solidFill>
+              <a:srgbClr val="000000"/>
+            </a:solidFill>
+            <a:miter lim="800000"/>
+            <a:headEnd/>
+            <a:tailEnd/>
+          </a:ln>
+        </p:spPr>
       </p:sp>
       <p:sp>
         <p:nvSpPr>
-          <p:cNvPr id="3" name="2 Marcador de notas"/>
+          <p:cNvPr id="52226" name="2 Marcador de notas"/>
           <p:cNvSpPr>
             <a:spLocks noGrp="1"/>
           </p:cNvSpPr>
@@ -996,12 +1045,18 @@
             <p:ph type="body" idx="1"/>
           </p:nvPr>
         </p:nvSpPr>
-        <p:spPr/>
+        <p:spPr bwMode="auto">
+          <a:noFill/>
+        </p:spPr>
         <p:txBody>
-          <a:bodyPr/>
+          <a:bodyPr wrap="square" numCol="1" anchor="t" anchorCtr="0" compatLnSpc="1">
+            <a:prstTxWarp prst="textNoShape">
+              <a:avLst/>
+            </a:prstTxWarp>
+          </a:bodyPr>
           <a:lstStyle/>
           <a:p>
-            <a:endParaRPr lang="es-PE" dirty="0"/>
+            <a:endParaRPr lang="es-ES" smtClean="0"/>
           </a:p>
         </p:txBody>
       </p:sp>
@@ -1012,7 +1067,7 @@
             <a:spLocks noGrp="1"/>
           </p:cNvSpPr>
           <p:nvPr>
-            <p:ph type="sldNum" sz="quarter" idx="10"/>
+            <p:ph type="sldNum" sz="quarter" idx="5"/>
           </p:nvPr>
         </p:nvSpPr>
         <p:spPr/>
@@ -1023,7 +1078,7 @@
             <a:pPr>
               <a:defRPr/>
             </a:pPr>
-            <a:fld id="{B6AD17A9-84E5-4211-9606-97F61C9A41E1}" type="slidenum">
+            <a:fld id="{E3F2CF91-BB2B-4612-BADF-539F4C7C8244}" type="slidenum">
               <a:rPr lang="es-PE" smtClean="0"/>
               <a:pPr>
                 <a:defRPr/>
@@ -1035,11 +1090,6 @@
         </p:txBody>
       </p:sp>
     </p:spTree>
-    <p:extLst>
-      <p:ext uri="{BB962C8B-B14F-4D97-AF65-F5344CB8AC3E}">
-        <p14:creationId xmlns:p14="http://schemas.microsoft.com/office/powerpoint/2010/main" val="1271673881"/>
-      </p:ext>
-    </p:extLst>
   </p:cSld>
   <p:clrMapOvr>
     <a:masterClrMapping/>
@@ -1066,7 +1116,7 @@
       </p:grpSpPr>
       <p:sp>
         <p:nvSpPr>
-          <p:cNvPr id="2" name="1 Marcador de imagen de diapositiva"/>
+          <p:cNvPr id="21505" name="1 Marcador de imagen de diapositiva"/>
           <p:cNvSpPr>
             <a:spLocks noGrp="1" noRot="1" noChangeAspect="1"/>
           </p:cNvSpPr>
@@ -1074,11 +1124,21 @@
             <p:ph type="sldImg"/>
           </p:nvPr>
         </p:nvSpPr>
-        <p:spPr/>
+        <p:spPr bwMode="auto">
+          <a:noFill/>
+          <a:ln>
+            <a:solidFill>
+              <a:srgbClr val="000000"/>
+            </a:solidFill>
+            <a:miter lim="800000"/>
+            <a:headEnd/>
+            <a:tailEnd/>
+          </a:ln>
+        </p:spPr>
       </p:sp>
       <p:sp>
         <p:nvSpPr>
-          <p:cNvPr id="3" name="2 Marcador de notas"/>
+          <p:cNvPr id="21506" name="2 Marcador de notas"/>
           <p:cNvSpPr>
             <a:spLocks noGrp="1"/>
           </p:cNvSpPr>
@@ -1086,12 +1146,18 @@
             <p:ph type="body" idx="1"/>
           </p:nvPr>
         </p:nvSpPr>
-        <p:spPr/>
+        <p:spPr bwMode="auto">
+          <a:noFill/>
+        </p:spPr>
         <p:txBody>
-          <a:bodyPr/>
+          <a:bodyPr wrap="square" numCol="1" anchor="t" anchorCtr="0" compatLnSpc="1">
+            <a:prstTxWarp prst="textNoShape">
+              <a:avLst/>
+            </a:prstTxWarp>
+          </a:bodyPr>
           <a:lstStyle/>
           <a:p>
-            <a:endParaRPr lang="es-PE" dirty="0"/>
+            <a:endParaRPr lang="es-ES" smtClean="0"/>
           </a:p>
         </p:txBody>
       </p:sp>
@@ -1102,7 +1168,7 @@
             <a:spLocks noGrp="1"/>
           </p:cNvSpPr>
           <p:nvPr>
-            <p:ph type="sldNum" sz="quarter" idx="10"/>
+            <p:ph type="sldNum" sz="quarter" idx="5"/>
           </p:nvPr>
         </p:nvSpPr>
         <p:spPr/>
@@ -1113,7 +1179,7 @@
             <a:pPr>
               <a:defRPr/>
             </a:pPr>
-            <a:fld id="{B6AD17A9-84E5-4211-9606-97F61C9A41E1}" type="slidenum">
+            <a:fld id="{1BDD0FC9-930E-4A1D-8E52-4721472E38DD}" type="slidenum">
               <a:rPr lang="es-PE" smtClean="0"/>
               <a:pPr>
                 <a:defRPr/>
@@ -1125,11 +1191,6 @@
         </p:txBody>
       </p:sp>
     </p:spTree>
-    <p:extLst>
-      <p:ext uri="{BB962C8B-B14F-4D97-AF65-F5344CB8AC3E}">
-        <p14:creationId xmlns:p14="http://schemas.microsoft.com/office/powerpoint/2010/main" val="1271673881"/>
-      </p:ext>
-    </p:extLst>
   </p:cSld>
   <p:clrMapOvr>
     <a:masterClrMapping/>
@@ -1156,7 +1217,7 @@
       </p:grpSpPr>
       <p:sp>
         <p:nvSpPr>
-          <p:cNvPr id="2" name="1 Marcador de imagen de diapositiva"/>
+          <p:cNvPr id="23553" name="1 Marcador de imagen de diapositiva"/>
           <p:cNvSpPr>
             <a:spLocks noGrp="1" noRot="1" noChangeAspect="1"/>
           </p:cNvSpPr>
@@ -1164,11 +1225,21 @@
             <p:ph type="sldImg"/>
           </p:nvPr>
         </p:nvSpPr>
-        <p:spPr/>
+        <p:spPr bwMode="auto">
+          <a:noFill/>
+          <a:ln>
+            <a:solidFill>
+              <a:srgbClr val="000000"/>
+            </a:solidFill>
+            <a:miter lim="800000"/>
+            <a:headEnd/>
+            <a:tailEnd/>
+          </a:ln>
+        </p:spPr>
       </p:sp>
       <p:sp>
         <p:nvSpPr>
-          <p:cNvPr id="3" name="2 Marcador de notas"/>
+          <p:cNvPr id="23554" name="2 Marcador de notas"/>
           <p:cNvSpPr>
             <a:spLocks noGrp="1"/>
           </p:cNvSpPr>
@@ -1176,12 +1247,18 @@
             <p:ph type="body" idx="1"/>
           </p:nvPr>
         </p:nvSpPr>
-        <p:spPr/>
+        <p:spPr bwMode="auto">
+          <a:noFill/>
+        </p:spPr>
         <p:txBody>
-          <a:bodyPr/>
+          <a:bodyPr wrap="square" numCol="1" anchor="t" anchorCtr="0" compatLnSpc="1">
+            <a:prstTxWarp prst="textNoShape">
+              <a:avLst/>
+            </a:prstTxWarp>
+          </a:bodyPr>
           <a:lstStyle/>
           <a:p>
-            <a:endParaRPr lang="es-PE" dirty="0"/>
+            <a:endParaRPr lang="es-ES" smtClean="0"/>
           </a:p>
         </p:txBody>
       </p:sp>
@@ -1192,7 +1269,7 @@
             <a:spLocks noGrp="1"/>
           </p:cNvSpPr>
           <p:nvPr>
-            <p:ph type="sldNum" sz="quarter" idx="10"/>
+            <p:ph type="sldNum" sz="quarter" idx="5"/>
           </p:nvPr>
         </p:nvSpPr>
         <p:spPr/>
@@ -1203,7 +1280,7 @@
             <a:pPr>
               <a:defRPr/>
             </a:pPr>
-            <a:fld id="{B6AD17A9-84E5-4211-9606-97F61C9A41E1}" type="slidenum">
+            <a:fld id="{6C20F540-397D-4B60-A34F-BBA456D3AC68}" type="slidenum">
               <a:rPr lang="es-PE" smtClean="0"/>
               <a:pPr>
                 <a:defRPr/>
@@ -1215,11 +1292,6 @@
         </p:txBody>
       </p:sp>
     </p:spTree>
-    <p:extLst>
-      <p:ext uri="{BB962C8B-B14F-4D97-AF65-F5344CB8AC3E}">
-        <p14:creationId xmlns:p14="http://schemas.microsoft.com/office/powerpoint/2010/main" val="1271673881"/>
-      </p:ext>
-    </p:extLst>
   </p:cSld>
   <p:clrMapOvr>
     <a:masterClrMapping/>
@@ -1246,7 +1318,7 @@
       </p:grpSpPr>
       <p:sp>
         <p:nvSpPr>
-          <p:cNvPr id="2" name="1 Marcador de imagen de diapositiva"/>
+          <p:cNvPr id="28673" name="1 Marcador de imagen de diapositiva"/>
           <p:cNvSpPr>
             <a:spLocks noGrp="1" noRot="1" noChangeAspect="1"/>
           </p:cNvSpPr>
@@ -1254,11 +1326,21 @@
             <p:ph type="sldImg"/>
           </p:nvPr>
         </p:nvSpPr>
-        <p:spPr/>
+        <p:spPr bwMode="auto">
+          <a:noFill/>
+          <a:ln>
+            <a:solidFill>
+              <a:srgbClr val="000000"/>
+            </a:solidFill>
+            <a:miter lim="800000"/>
+            <a:headEnd/>
+            <a:tailEnd/>
+          </a:ln>
+        </p:spPr>
       </p:sp>
       <p:sp>
         <p:nvSpPr>
-          <p:cNvPr id="3" name="2 Marcador de notas"/>
+          <p:cNvPr id="28674" name="2 Marcador de notas"/>
           <p:cNvSpPr>
             <a:spLocks noGrp="1"/>
           </p:cNvSpPr>
@@ -1266,12 +1348,18 @@
             <p:ph type="body" idx="1"/>
           </p:nvPr>
         </p:nvSpPr>
-        <p:spPr/>
+        <p:spPr bwMode="auto">
+          <a:noFill/>
+        </p:spPr>
         <p:txBody>
-          <a:bodyPr/>
+          <a:bodyPr wrap="square" numCol="1" anchor="t" anchorCtr="0" compatLnSpc="1">
+            <a:prstTxWarp prst="textNoShape">
+              <a:avLst/>
+            </a:prstTxWarp>
+          </a:bodyPr>
           <a:lstStyle/>
           <a:p>
-            <a:endParaRPr lang="es-PE" dirty="0"/>
+            <a:endParaRPr lang="es-ES" smtClean="0"/>
           </a:p>
         </p:txBody>
       </p:sp>
@@ -1282,7 +1370,7 @@
             <a:spLocks noGrp="1"/>
           </p:cNvSpPr>
           <p:nvPr>
-            <p:ph type="sldNum" sz="quarter" idx="10"/>
+            <p:ph type="sldNum" sz="quarter" idx="5"/>
           </p:nvPr>
         </p:nvSpPr>
         <p:spPr/>
@@ -1293,7 +1381,7 @@
             <a:pPr>
               <a:defRPr/>
             </a:pPr>
-            <a:fld id="{B6AD17A9-84E5-4211-9606-97F61C9A41E1}" type="slidenum">
+            <a:fld id="{E3BEAF12-CD83-4FE9-9C71-524F02E95379}" type="slidenum">
               <a:rPr lang="es-PE" smtClean="0"/>
               <a:pPr>
                 <a:defRPr/>
@@ -1305,11 +1393,6 @@
         </p:txBody>
       </p:sp>
     </p:spTree>
-    <p:extLst>
-      <p:ext uri="{BB962C8B-B14F-4D97-AF65-F5344CB8AC3E}">
-        <p14:creationId xmlns:p14="http://schemas.microsoft.com/office/powerpoint/2010/main" val="1271673881"/>
-      </p:ext>
-    </p:extLst>
   </p:cSld>
   <p:clrMapOvr>
     <a:masterClrMapping/>
@@ -1336,7 +1419,7 @@
       </p:grpSpPr>
       <p:sp>
         <p:nvSpPr>
-          <p:cNvPr id="2" name="1 Marcador de imagen de diapositiva"/>
+          <p:cNvPr id="30721" name="1 Marcador de imagen de diapositiva"/>
           <p:cNvSpPr>
             <a:spLocks noGrp="1" noRot="1" noChangeAspect="1"/>
           </p:cNvSpPr>
@@ -1344,11 +1427,21 @@
             <p:ph type="sldImg"/>
           </p:nvPr>
         </p:nvSpPr>
-        <p:spPr/>
+        <p:spPr bwMode="auto">
+          <a:noFill/>
+          <a:ln>
+            <a:solidFill>
+              <a:srgbClr val="000000"/>
+            </a:solidFill>
+            <a:miter lim="800000"/>
+            <a:headEnd/>
+            <a:tailEnd/>
+          </a:ln>
+        </p:spPr>
       </p:sp>
       <p:sp>
         <p:nvSpPr>
-          <p:cNvPr id="3" name="2 Marcador de notas"/>
+          <p:cNvPr id="30722" name="2 Marcador de notas"/>
           <p:cNvSpPr>
             <a:spLocks noGrp="1"/>
           </p:cNvSpPr>
@@ -1356,12 +1449,18 @@
             <p:ph type="body" idx="1"/>
           </p:nvPr>
         </p:nvSpPr>
-        <p:spPr/>
+        <p:spPr bwMode="auto">
+          <a:noFill/>
+        </p:spPr>
         <p:txBody>
-          <a:bodyPr/>
+          <a:bodyPr wrap="square" numCol="1" anchor="t" anchorCtr="0" compatLnSpc="1">
+            <a:prstTxWarp prst="textNoShape">
+              <a:avLst/>
+            </a:prstTxWarp>
+          </a:bodyPr>
           <a:lstStyle/>
           <a:p>
-            <a:endParaRPr lang="es-PE" dirty="0"/>
+            <a:endParaRPr lang="es-ES" smtClean="0"/>
           </a:p>
         </p:txBody>
       </p:sp>
@@ -1372,7 +1471,7 @@
             <a:spLocks noGrp="1"/>
           </p:cNvSpPr>
           <p:nvPr>
-            <p:ph type="sldNum" sz="quarter" idx="10"/>
+            <p:ph type="sldNum" sz="quarter" idx="5"/>
           </p:nvPr>
         </p:nvSpPr>
         <p:spPr/>
@@ -1383,7 +1482,7 @@
             <a:pPr>
               <a:defRPr/>
             </a:pPr>
-            <a:fld id="{B6AD17A9-84E5-4211-9606-97F61C9A41E1}" type="slidenum">
+            <a:fld id="{8F77ACAA-0C16-4114-BCE1-F722174438C4}" type="slidenum">
               <a:rPr lang="es-PE" smtClean="0"/>
               <a:pPr>
                 <a:defRPr/>
@@ -1395,11 +1494,6 @@
         </p:txBody>
       </p:sp>
     </p:spTree>
-    <p:extLst>
-      <p:ext uri="{BB962C8B-B14F-4D97-AF65-F5344CB8AC3E}">
-        <p14:creationId xmlns:p14="http://schemas.microsoft.com/office/powerpoint/2010/main" val="1271673881"/>
-      </p:ext>
-    </p:extLst>
   </p:cSld>
   <p:clrMapOvr>
     <a:masterClrMapping/>
@@ -1426,7 +1520,7 @@
       </p:grpSpPr>
       <p:sp>
         <p:nvSpPr>
-          <p:cNvPr id="2" name="1 Marcador de imagen de diapositiva"/>
+          <p:cNvPr id="32769" name="1 Marcador de imagen de diapositiva"/>
           <p:cNvSpPr>
             <a:spLocks noGrp="1" noRot="1" noChangeAspect="1"/>
           </p:cNvSpPr>
@@ -1434,11 +1528,21 @@
             <p:ph type="sldImg"/>
           </p:nvPr>
         </p:nvSpPr>
-        <p:spPr/>
+        <p:spPr bwMode="auto">
+          <a:noFill/>
+          <a:ln>
+            <a:solidFill>
+              <a:srgbClr val="000000"/>
+            </a:solidFill>
+            <a:miter lim="800000"/>
+            <a:headEnd/>
+            <a:tailEnd/>
+          </a:ln>
+        </p:spPr>
       </p:sp>
       <p:sp>
         <p:nvSpPr>
-          <p:cNvPr id="3" name="2 Marcador de notas"/>
+          <p:cNvPr id="32770" name="2 Marcador de notas"/>
           <p:cNvSpPr>
             <a:spLocks noGrp="1"/>
           </p:cNvSpPr>
@@ -1446,12 +1550,18 @@
             <p:ph type="body" idx="1"/>
           </p:nvPr>
         </p:nvSpPr>
-        <p:spPr/>
+        <p:spPr bwMode="auto">
+          <a:noFill/>
+        </p:spPr>
         <p:txBody>
-          <a:bodyPr/>
+          <a:bodyPr wrap="square" numCol="1" anchor="t" anchorCtr="0" compatLnSpc="1">
+            <a:prstTxWarp prst="textNoShape">
+              <a:avLst/>
+            </a:prstTxWarp>
+          </a:bodyPr>
           <a:lstStyle/>
           <a:p>
-            <a:endParaRPr lang="es-PE" dirty="0"/>
+            <a:endParaRPr lang="es-ES" smtClean="0"/>
           </a:p>
         </p:txBody>
       </p:sp>
@@ -1462,7 +1572,7 @@
             <a:spLocks noGrp="1"/>
           </p:cNvSpPr>
           <p:nvPr>
-            <p:ph type="sldNum" sz="quarter" idx="10"/>
+            <p:ph type="sldNum" sz="quarter" idx="5"/>
           </p:nvPr>
         </p:nvSpPr>
         <p:spPr/>
@@ -1473,7 +1583,7 @@
             <a:pPr>
               <a:defRPr/>
             </a:pPr>
-            <a:fld id="{B6AD17A9-84E5-4211-9606-97F61C9A41E1}" type="slidenum">
+            <a:fld id="{1EF3A7CB-3F6A-4022-8766-64C7AF4575D5}" type="slidenum">
               <a:rPr lang="es-PE" smtClean="0"/>
               <a:pPr>
                 <a:defRPr/>
@@ -1485,11 +1595,6 @@
         </p:txBody>
       </p:sp>
     </p:spTree>
-    <p:extLst>
-      <p:ext uri="{BB962C8B-B14F-4D97-AF65-F5344CB8AC3E}">
-        <p14:creationId xmlns:p14="http://schemas.microsoft.com/office/powerpoint/2010/main" val="1271673881"/>
-      </p:ext>
-    </p:extLst>
   </p:cSld>
   <p:clrMapOvr>
     <a:masterClrMapping/>
@@ -1516,7 +1621,7 @@
       </p:grpSpPr>
       <p:sp>
         <p:nvSpPr>
-          <p:cNvPr id="2" name="1 Marcador de imagen de diapositiva"/>
+          <p:cNvPr id="35841" name="1 Marcador de imagen de diapositiva"/>
           <p:cNvSpPr>
             <a:spLocks noGrp="1" noRot="1" noChangeAspect="1"/>
           </p:cNvSpPr>
@@ -1524,11 +1629,21 @@
             <p:ph type="sldImg"/>
           </p:nvPr>
         </p:nvSpPr>
-        <p:spPr/>
+        <p:spPr bwMode="auto">
+          <a:noFill/>
+          <a:ln>
+            <a:solidFill>
+              <a:srgbClr val="000000"/>
+            </a:solidFill>
+            <a:miter lim="800000"/>
+            <a:headEnd/>
+            <a:tailEnd/>
+          </a:ln>
+        </p:spPr>
       </p:sp>
       <p:sp>
         <p:nvSpPr>
-          <p:cNvPr id="3" name="2 Marcador de notas"/>
+          <p:cNvPr id="35842" name="2 Marcador de notas"/>
           <p:cNvSpPr>
             <a:spLocks noGrp="1"/>
           </p:cNvSpPr>
@@ -1536,12 +1651,18 @@
             <p:ph type="body" idx="1"/>
           </p:nvPr>
         </p:nvSpPr>
-        <p:spPr/>
+        <p:spPr bwMode="auto">
+          <a:noFill/>
+        </p:spPr>
         <p:txBody>
-          <a:bodyPr/>
+          <a:bodyPr wrap="square" numCol="1" anchor="t" anchorCtr="0" compatLnSpc="1">
+            <a:prstTxWarp prst="textNoShape">
+              <a:avLst/>
+            </a:prstTxWarp>
+          </a:bodyPr>
           <a:lstStyle/>
           <a:p>
-            <a:endParaRPr lang="es-PE" dirty="0"/>
+            <a:endParaRPr lang="es-ES" smtClean="0"/>
           </a:p>
         </p:txBody>
       </p:sp>
@@ -1552,7 +1673,7 @@
             <a:spLocks noGrp="1"/>
           </p:cNvSpPr>
           <p:nvPr>
-            <p:ph type="sldNum" sz="quarter" idx="10"/>
+            <p:ph type="sldNum" sz="quarter" idx="5"/>
           </p:nvPr>
         </p:nvSpPr>
         <p:spPr/>
@@ -1563,7 +1684,7 @@
             <a:pPr>
               <a:defRPr/>
             </a:pPr>
-            <a:fld id="{B6AD17A9-84E5-4211-9606-97F61C9A41E1}" type="slidenum">
+            <a:fld id="{C64541C2-98D2-478D-8D99-BA1ADE45A86B}" type="slidenum">
               <a:rPr lang="es-PE" smtClean="0"/>
               <a:pPr>
                 <a:defRPr/>
@@ -1575,11 +1696,6 @@
         </p:txBody>
       </p:sp>
     </p:spTree>
-    <p:extLst>
-      <p:ext uri="{BB962C8B-B14F-4D97-AF65-F5344CB8AC3E}">
-        <p14:creationId xmlns:p14="http://schemas.microsoft.com/office/powerpoint/2010/main" val="1271673881"/>
-      </p:ext>
-    </p:extLst>
   </p:cSld>
   <p:clrMapOvr>
     <a:masterClrMapping/>
@@ -1606,7 +1722,7 @@
       </p:grpSpPr>
       <p:sp>
         <p:nvSpPr>
-          <p:cNvPr id="2" name="1 Marcador de imagen de diapositiva"/>
+          <p:cNvPr id="37889" name="1 Marcador de imagen de diapositiva"/>
           <p:cNvSpPr>
             <a:spLocks noGrp="1" noRot="1" noChangeAspect="1"/>
           </p:cNvSpPr>
@@ -1614,11 +1730,21 @@
             <p:ph type="sldImg"/>
           </p:nvPr>
         </p:nvSpPr>
-        <p:spPr/>
+        <p:spPr bwMode="auto">
+          <a:noFill/>
+          <a:ln>
+            <a:solidFill>
+              <a:srgbClr val="000000"/>
+            </a:solidFill>
+            <a:miter lim="800000"/>
+            <a:headEnd/>
+            <a:tailEnd/>
+          </a:ln>
+        </p:spPr>
       </p:sp>
       <p:sp>
         <p:nvSpPr>
-          <p:cNvPr id="3" name="2 Marcador de notas"/>
+          <p:cNvPr id="37890" name="2 Marcador de notas"/>
           <p:cNvSpPr>
             <a:spLocks noGrp="1"/>
           </p:cNvSpPr>
@@ -1626,12 +1752,18 @@
             <p:ph type="body" idx="1"/>
           </p:nvPr>
         </p:nvSpPr>
-        <p:spPr/>
+        <p:spPr bwMode="auto">
+          <a:noFill/>
+        </p:spPr>
         <p:txBody>
-          <a:bodyPr/>
+          <a:bodyPr wrap="square" numCol="1" anchor="t" anchorCtr="0" compatLnSpc="1">
+            <a:prstTxWarp prst="textNoShape">
+              <a:avLst/>
+            </a:prstTxWarp>
+          </a:bodyPr>
           <a:lstStyle/>
           <a:p>
-            <a:endParaRPr lang="es-PE" dirty="0"/>
+            <a:endParaRPr lang="es-ES" smtClean="0"/>
           </a:p>
         </p:txBody>
       </p:sp>
@@ -1642,7 +1774,7 @@
             <a:spLocks noGrp="1"/>
           </p:cNvSpPr>
           <p:nvPr>
-            <p:ph type="sldNum" sz="quarter" idx="10"/>
+            <p:ph type="sldNum" sz="quarter" idx="5"/>
           </p:nvPr>
         </p:nvSpPr>
         <p:spPr/>
@@ -1653,7 +1785,7 @@
             <a:pPr>
               <a:defRPr/>
             </a:pPr>
-            <a:fld id="{B6AD17A9-84E5-4211-9606-97F61C9A41E1}" type="slidenum">
+            <a:fld id="{B45EBC4D-B715-455F-AD7F-ABDAA3C53A77}" type="slidenum">
               <a:rPr lang="es-PE" smtClean="0"/>
               <a:pPr>
                 <a:defRPr/>
@@ -1665,11 +1797,6 @@
         </p:txBody>
       </p:sp>
     </p:spTree>
-    <p:extLst>
-      <p:ext uri="{BB962C8B-B14F-4D97-AF65-F5344CB8AC3E}">
-        <p14:creationId xmlns:p14="http://schemas.microsoft.com/office/powerpoint/2010/main" val="1271673881"/>
-      </p:ext>
-    </p:extLst>
   </p:cSld>
   <p:clrMapOvr>
     <a:masterClrMapping/>
@@ -1696,7 +1823,7 @@
       </p:grpSpPr>
       <p:sp>
         <p:nvSpPr>
-          <p:cNvPr id="2" name="1 Marcador de imagen de diapositiva"/>
+          <p:cNvPr id="40961" name="1 Marcador de imagen de diapositiva"/>
           <p:cNvSpPr>
             <a:spLocks noGrp="1" noRot="1" noChangeAspect="1"/>
           </p:cNvSpPr>
@@ -1704,11 +1831,21 @@
             <p:ph type="sldImg"/>
           </p:nvPr>
         </p:nvSpPr>
-        <p:spPr/>
+        <p:spPr bwMode="auto">
+          <a:noFill/>
+          <a:ln>
+            <a:solidFill>
+              <a:srgbClr val="000000"/>
+            </a:solidFill>
+            <a:miter lim="800000"/>
+            <a:headEnd/>
+            <a:tailEnd/>
+          </a:ln>
+        </p:spPr>
       </p:sp>
       <p:sp>
         <p:nvSpPr>
-          <p:cNvPr id="3" name="2 Marcador de notas"/>
+          <p:cNvPr id="40962" name="2 Marcador de notas"/>
           <p:cNvSpPr>
             <a:spLocks noGrp="1"/>
           </p:cNvSpPr>
@@ -1716,12 +1853,18 @@
             <p:ph type="body" idx="1"/>
           </p:nvPr>
         </p:nvSpPr>
-        <p:spPr/>
+        <p:spPr bwMode="auto">
+          <a:noFill/>
+        </p:spPr>
         <p:txBody>
-          <a:bodyPr/>
+          <a:bodyPr wrap="square" numCol="1" anchor="t" anchorCtr="0" compatLnSpc="1">
+            <a:prstTxWarp prst="textNoShape">
+              <a:avLst/>
+            </a:prstTxWarp>
+          </a:bodyPr>
           <a:lstStyle/>
           <a:p>
-            <a:endParaRPr lang="es-PE" dirty="0"/>
+            <a:endParaRPr lang="es-ES" smtClean="0"/>
           </a:p>
         </p:txBody>
       </p:sp>
@@ -1732,7 +1875,7 @@
             <a:spLocks noGrp="1"/>
           </p:cNvSpPr>
           <p:nvPr>
-            <p:ph type="sldNum" sz="quarter" idx="10"/>
+            <p:ph type="sldNum" sz="quarter" idx="5"/>
           </p:nvPr>
         </p:nvSpPr>
         <p:spPr/>
@@ -1743,7 +1886,7 @@
             <a:pPr>
               <a:defRPr/>
             </a:pPr>
-            <a:fld id="{B6AD17A9-84E5-4211-9606-97F61C9A41E1}" type="slidenum">
+            <a:fld id="{2C43339C-AA73-4483-9CCD-C0990F6A5C40}" type="slidenum">
               <a:rPr lang="es-PE" smtClean="0"/>
               <a:pPr>
                 <a:defRPr/>
@@ -1755,11 +1898,6 @@
         </p:txBody>
       </p:sp>
     </p:spTree>
-    <p:extLst>
-      <p:ext uri="{BB962C8B-B14F-4D97-AF65-F5344CB8AC3E}">
-        <p14:creationId xmlns:p14="http://schemas.microsoft.com/office/powerpoint/2010/main" val="1271673881"/>
-      </p:ext>
-    </p:extLst>
   </p:cSld>
   <p:clrMapOvr>
     <a:masterClrMapping/>
@@ -3627,7 +3765,7 @@
             <a:pPr>
               <a:defRPr/>
             </a:pPr>
-            <a:fld id="{83A0DCAB-2E35-44CD-AB46-F45CF3FCD79F}" type="datetimeFigureOut">
+            <a:fld id="{6B35BDC8-FD13-4BF7-855C-B6E1A3CC3B35}" type="datetimeFigureOut">
               <a:rPr lang="es-PE"/>
               <a:pPr>
                 <a:defRPr/>
@@ -3686,7 +3824,7 @@
             <a:pPr>
               <a:defRPr/>
             </a:pPr>
-            <a:fld id="{A79953B0-F2F0-4824-B0F0-6398088E801E}" type="slidenum">
+            <a:fld id="{5C3F56AB-ACB1-4480-A2C0-3007FD278A81}" type="slidenum">
               <a:rPr lang="es-PE"/>
               <a:pPr>
                 <a:defRPr/>
@@ -3835,7 +3973,7 @@
             <a:pPr>
               <a:defRPr/>
             </a:pPr>
-            <a:fld id="{5B8C3C97-60D3-4384-8D7E-38F74A787DCE}" type="datetimeFigureOut">
+            <a:fld id="{7B297C8B-1F26-4B24-A665-FDC29B577567}" type="datetimeFigureOut">
               <a:rPr lang="es-PE"/>
               <a:pPr>
                 <a:defRPr/>
@@ -3894,7 +4032,7 @@
             <a:pPr>
               <a:defRPr/>
             </a:pPr>
-            <a:fld id="{3C9AFD62-4472-4EF6-B391-3595811CF404}" type="slidenum">
+            <a:fld id="{43D37F2B-721C-41B5-9792-B404C2CE5BFD}" type="slidenum">
               <a:rPr lang="es-PE"/>
               <a:pPr>
                 <a:defRPr/>
@@ -5740,7 +5878,7 @@
             <a:pPr>
               <a:defRPr/>
             </a:pPr>
-            <a:fld id="{F91A28E9-E69A-45A1-945C-A117578C2419}" type="datetimeFigureOut">
+            <a:fld id="{0B962058-1191-4D20-AF6B-CEC9DE8B54F9}" type="datetimeFigureOut">
               <a:rPr lang="es-PE"/>
               <a:pPr>
                 <a:defRPr/>
@@ -5799,7 +5937,7 @@
             <a:pPr>
               <a:defRPr/>
             </a:pPr>
-            <a:fld id="{A0FCAB04-40B6-42B7-B863-33CB07DC7171}" type="slidenum">
+            <a:fld id="{F45111E4-C9EC-4A28-A668-9D3467150C9A}" type="slidenum">
               <a:rPr lang="es-PE"/>
               <a:pPr>
                 <a:defRPr/>
@@ -5857,7 +5995,7 @@
             <a:pPr>
               <a:defRPr/>
             </a:pPr>
-            <a:fld id="{9EDB1757-D16D-4FB2-805D-172CD4179C62}" type="datetimeFigureOut">
+            <a:fld id="{51C1DF64-E3F4-4714-B0A8-84E9F7A16429}" type="datetimeFigureOut">
               <a:rPr lang="es-PE"/>
               <a:pPr>
                 <a:defRPr/>
@@ -5916,7 +6054,7 @@
             <a:pPr>
               <a:defRPr/>
             </a:pPr>
-            <a:fld id="{0DE993FF-0DBE-427E-B745-CC03A954D706}" type="slidenum">
+            <a:fld id="{967E2763-7A51-4198-982B-9C959D62034B}" type="slidenum">
               <a:rPr lang="es-PE"/>
               <a:pPr>
                 <a:defRPr/>
@@ -6049,7 +6187,7 @@
             <a:pPr>
               <a:defRPr/>
             </a:pPr>
-            <a:fld id="{842A73F4-0CE3-4839-B66D-CAC85D2C749F}" type="datetimeFigureOut">
+            <a:fld id="{02D376A9-DE34-4683-98BF-BF591A9C86B2}" type="datetimeFigureOut">
               <a:rPr lang="es-PE"/>
               <a:pPr>
                 <a:defRPr/>
@@ -6108,7 +6246,7 @@
             <a:pPr>
               <a:defRPr/>
             </a:pPr>
-            <a:fld id="{8C4EE410-8DC1-44F5-AE88-74DA5FFDF5FA}" type="slidenum">
+            <a:fld id="{934ECF9E-9C27-4FFD-B1D4-40B55CC9FC0B}" type="slidenum">
               <a:rPr lang="es-PE"/>
               <a:pPr>
                 <a:defRPr/>
@@ -7966,7 +8104,7 @@
             <a:pPr>
               <a:defRPr/>
             </a:pPr>
-            <a:fld id="{9B4FF8B9-DF58-4310-8677-99FFDA7D5662}" type="datetimeFigureOut">
+            <a:fld id="{D5AB0344-AB75-4563-B7C6-99D969023392}" type="datetimeFigureOut">
               <a:rPr lang="es-PE"/>
               <a:pPr>
                 <a:defRPr/>
@@ -8025,7 +8163,7 @@
             <a:pPr>
               <a:defRPr/>
             </a:pPr>
-            <a:fld id="{FEDA5069-8F7B-42B0-8570-1A09119FD551}" type="slidenum">
+            <a:fld id="{989ADE72-7F4D-4E09-8788-962EA4206721}" type="slidenum">
               <a:rPr lang="es-PE"/>
               <a:pPr>
                 <a:defRPr/>
@@ -8220,7 +8358,7 @@
             <a:pPr>
               <a:defRPr/>
             </a:pPr>
-            <a:fld id="{55545F2B-3777-4B5E-8E08-5CEF0EAB20E1}" type="datetimeFigureOut">
+            <a:fld id="{2AAD47DA-B742-448A-8396-6131F2574B59}" type="datetimeFigureOut">
               <a:rPr lang="es-PE"/>
               <a:pPr>
                 <a:defRPr/>
@@ -8279,7 +8417,7 @@
             <a:pPr>
               <a:defRPr/>
             </a:pPr>
-            <a:fld id="{19234FEE-36E2-4F6B-BAD4-772C0867B970}" type="slidenum">
+            <a:fld id="{2461820B-ED5C-4100-8A1A-8E7640EA997E}" type="slidenum">
               <a:rPr lang="es-PE"/>
               <a:pPr>
                 <a:defRPr/>
@@ -8674,7 +8812,7 @@
             <a:pPr>
               <a:defRPr/>
             </a:pPr>
-            <a:fld id="{366ECD3B-D60D-48CF-9D4C-AC96558F7FBB}" type="datetimeFigureOut">
+            <a:fld id="{70D37C80-70E1-4BE4-8078-72183760BBF9}" type="datetimeFigureOut">
               <a:rPr lang="es-PE"/>
               <a:pPr>
                 <a:defRPr/>
@@ -8733,7 +8871,7 @@
             <a:pPr>
               <a:defRPr/>
             </a:pPr>
-            <a:fld id="{1F0D69CB-3CD6-472E-99BB-B25B9A2D55F2}" type="slidenum">
+            <a:fld id="{372BA01D-2481-4C8D-802A-E8ABF31A13E6}" type="slidenum">
               <a:rPr lang="es-PE"/>
               <a:pPr>
                 <a:defRPr/>
@@ -8814,7 +8952,7 @@
             <a:pPr>
               <a:defRPr/>
             </a:pPr>
-            <a:fld id="{1A8F74FB-F4D2-468F-B103-94E57085E19C}" type="datetimeFigureOut">
+            <a:fld id="{35A2D6C9-C8AD-419A-903B-0F3307195841}" type="datetimeFigureOut">
               <a:rPr lang="es-PE"/>
               <a:pPr>
                 <a:defRPr/>
@@ -8873,7 +9011,7 @@
             <a:pPr>
               <a:defRPr/>
             </a:pPr>
-            <a:fld id="{D01E3F71-13CB-434F-B2C8-37E102375BF8}" type="slidenum">
+            <a:fld id="{00343336-5AB5-4005-88C5-87B6C444FA19}" type="slidenum">
               <a:rPr lang="es-PE"/>
               <a:pPr>
                 <a:defRPr/>
@@ -10595,7 +10733,7 @@
             <a:pPr>
               <a:defRPr/>
             </a:pPr>
-            <a:fld id="{4C546228-A34E-4894-A9B6-FE4978962D8F}" type="datetimeFigureOut">
+            <a:fld id="{380F2D21-BCA7-4159-9A3E-15C2E055F9B7}" type="datetimeFigureOut">
               <a:rPr lang="es-PE"/>
               <a:pPr>
                 <a:defRPr/>
@@ -10654,7 +10792,7 @@
             <a:pPr>
               <a:defRPr/>
             </a:pPr>
-            <a:fld id="{4F44E1CF-D127-4913-A7CA-8C8D717811A7}" type="slidenum">
+            <a:fld id="{FBD16669-542B-44D2-848D-A33DFB1E645F}" type="slidenum">
               <a:rPr lang="es-PE"/>
               <a:pPr>
                 <a:defRPr/>
@@ -12611,7 +12749,7 @@
             <a:pPr>
               <a:defRPr/>
             </a:pPr>
-            <a:fld id="{215B44B7-69F5-41AF-8BFA-FA71F2C018C8}" type="datetimeFigureOut">
+            <a:fld id="{5B483571-7C11-4103-8A47-1D9E865D3959}" type="datetimeFigureOut">
               <a:rPr lang="es-PE"/>
               <a:pPr>
                 <a:defRPr/>
@@ -12670,7 +12808,7 @@
             <a:pPr>
               <a:defRPr/>
             </a:pPr>
-            <a:fld id="{9C0513CB-093E-4816-9CB2-D05DBD97F76C}" type="slidenum">
+            <a:fld id="{53459EA2-2F01-4B01-BA78-64090B4531FE}" type="slidenum">
               <a:rPr lang="es-PE"/>
               <a:pPr>
                 <a:defRPr/>
@@ -14598,7 +14736,7 @@
             <a:pPr>
               <a:defRPr/>
             </a:pPr>
-            <a:fld id="{073E66BF-E9F9-4FD3-9655-985881A922E6}" type="datetimeFigureOut">
+            <a:fld id="{BC78C620-BF58-4D00-B4C2-4810A427B2E1}" type="datetimeFigureOut">
               <a:rPr lang="es-PE"/>
               <a:pPr>
                 <a:defRPr/>
@@ -14657,7 +14795,7 @@
             <a:pPr>
               <a:defRPr/>
             </a:pPr>
-            <a:fld id="{A7464FDF-6AA1-4D93-864F-F1783304738F}" type="slidenum">
+            <a:fld id="{E0984922-23AD-41F4-95D9-CC4519B45D39}" type="slidenum">
               <a:rPr lang="es-PE"/>
               <a:pPr>
                 <a:defRPr/>
@@ -16446,7 +16584,7 @@
             <a:pPr>
               <a:defRPr/>
             </a:pPr>
-            <a:fld id="{B5460C7B-6A4C-4EC3-8DF8-79AABD17BAC2}" type="datetimeFigureOut">
+            <a:fld id="{442B46A8-163C-4E83-B0FE-35B7CA09250F}" type="datetimeFigureOut">
               <a:rPr lang="es-PE"/>
               <a:pPr>
                 <a:defRPr/>
@@ -16543,7 +16681,7 @@
             <a:pPr>
               <a:defRPr/>
             </a:pPr>
-            <a:fld id="{AEE91CB8-A8A6-41D8-A9DB-1D208AF0EE46}" type="slidenum">
+            <a:fld id="{F38B95F5-B22B-486A-93B8-95D7CA890411}" type="slidenum">
               <a:rPr lang="es-PE"/>
               <a:pPr>
                 <a:defRPr/>
@@ -17208,7 +17346,7 @@
       </p:grpSpPr>
       <p:sp>
         <p:nvSpPr>
-          <p:cNvPr id="3" name="2 Título"/>
+          <p:cNvPr id="27649" name="2 Título"/>
           <p:cNvSpPr txBox="1">
             <a:spLocks/>
           </p:cNvSpPr>
@@ -17231,9 +17369,7 @@
           </a:ln>
         </p:spPr>
         <p:txBody>
-          <a:bodyPr anchor="ctr">
-            <a:normAutofit/>
-          </a:bodyPr>
+          <a:bodyPr anchor="ctr"/>
           <a:lstStyle/>
           <a:p>
             <a:pPr algn="ctr">
@@ -17242,7 +17378,7 @@
               </a:lnSpc>
             </a:pPr>
             <a:r>
-              <a:rPr lang="es-PE" sz="3200" b="1" dirty="0" smtClean="0">
+              <a:rPr lang="es-PE" sz="3200" b="1">
                 <a:solidFill>
                   <a:srgbClr val="FFFFFF"/>
                 </a:solidFill>
@@ -17250,31 +17386,19 @@
               </a:rPr>
               <a:t>Mecanismos - Persistencia</a:t>
             </a:r>
-            <a:endParaRPr lang="es-PE" sz="3200" b="1" dirty="0">
-              <a:solidFill>
-                <a:srgbClr val="FFFFFF"/>
-              </a:solidFill>
-              <a:latin typeface="Candara" pitchFamily="34" charset="0"/>
-            </a:endParaRPr>
           </a:p>
         </p:txBody>
       </p:sp>
       <p:pic>
         <p:nvPicPr>
-          <p:cNvPr id="2050" name="Picture 2" descr="https://lh5.googleusercontent.com/xmqMwsyayTEsyi9wZOvdMswmSHmDLigFEHpb8MGmqB3R2azHCFmShTTHx_a1tttQMhMBf6yak9uy2VCGOY6JjOSFPBgrywXmD47vNKFRfZ9X7ff96Fg"/>
+          <p:cNvPr id="27650" name="Picture 2" descr="https://lh5.googleusercontent.com/xmqMwsyayTEsyi9wZOvdMswmSHmDLigFEHpb8MGmqB3R2azHCFmShTTHx_a1tttQMhMBf6yak9uy2VCGOY6JjOSFPBgrywXmD47vNKFRfZ9X7ff96Fg"/>
           <p:cNvPicPr>
             <a:picLocks noChangeAspect="1" noChangeArrowheads="1"/>
           </p:cNvPicPr>
           <p:nvPr/>
         </p:nvPicPr>
         <p:blipFill>
-          <a:blip r:embed="rId3">
-            <a:extLst>
-              <a:ext uri="{28A0092B-C50C-407E-A947-70E740481C1C}">
-                <a14:useLocalDpi xmlns:a14="http://schemas.microsoft.com/office/drawing/2010/main" val="0"/>
-              </a:ext>
-            </a:extLst>
-          </a:blip>
+          <a:blip r:embed="rId3"/>
           <a:srcRect/>
           <a:stretch>
             <a:fillRect/>
@@ -17282,22 +17406,19 @@
         </p:blipFill>
         <p:spPr bwMode="auto">
           <a:xfrm>
-            <a:off x="4045226" y="2574778"/>
-            <a:ext cx="4916292" cy="3528393"/>
+            <a:off x="4044950" y="2574925"/>
+            <a:ext cx="4916488" cy="3529013"/>
           </a:xfrm>
           <a:prstGeom prst="rect">
             <a:avLst/>
           </a:prstGeom>
           <a:noFill/>
-          <a:extLst>
-            <a:ext uri="{909E8E84-426E-40DD-AFC4-6F175D3DCCD1}">
-              <a14:hiddenFill xmlns:a14="http://schemas.microsoft.com/office/drawing/2010/main">
-                <a:solidFill>
-                  <a:srgbClr val="FFFFFF"/>
-                </a:solidFill>
-              </a14:hiddenFill>
-            </a:ext>
-          </a:extLst>
+          <a:ln w="9525">
+            <a:noFill/>
+            <a:miter lim="800000"/>
+            <a:headEnd/>
+            <a:tailEnd/>
+          </a:ln>
         </p:spPr>
       </p:pic>
       <p:sp>
@@ -17308,8 +17429,8 @@
         </p:nvSpPr>
         <p:spPr>
           <a:xfrm>
-            <a:off x="257875" y="2574778"/>
-            <a:ext cx="3512976" cy="2308324"/>
+            <a:off x="257175" y="2574925"/>
+            <a:ext cx="3513138" cy="2308225"/>
           </a:xfrm>
           <a:prstGeom prst="rect">
             <a:avLst/>
@@ -17317,35 +17438,42 @@
           <a:noFill/>
         </p:spPr>
         <p:txBody>
-          <a:bodyPr wrap="square" rtlCol="0">
+          <a:bodyPr>
             <a:spAutoFit/>
           </a:bodyPr>
           <a:lstStyle/>
           <a:p>
+            <a:pPr>
+              <a:defRPr/>
+            </a:pPr>
             <a:r>
-              <a:rPr lang="es-PE" sz="1600" b="1" dirty="0" err="1" smtClean="0">
+              <a:rPr lang="es-PE" sz="1600" b="1" dirty="0" err="1">
                 <a:latin typeface="+mn-lt"/>
               </a:rPr>
               <a:t>Nhibernate</a:t>
             </a:r>
-            <a:endParaRPr lang="es-PE" b="1" dirty="0" smtClean="0"/>
+            <a:endParaRPr lang="es-PE" b="1" dirty="0"/>
           </a:p>
           <a:p>
-            <a:pPr algn="just"/>
+            <a:pPr algn="just">
+              <a:defRPr/>
+            </a:pPr>
             <a:endParaRPr lang="es-PE" sz="1600" b="1" dirty="0">
               <a:latin typeface="+mn-lt"/>
             </a:endParaRPr>
           </a:p>
           <a:p>
-            <a:pPr algn="just"/>
+            <a:pPr algn="just">
+              <a:defRPr/>
+            </a:pPr>
             <a:r>
-              <a:rPr lang="es-PE" sz="1600" dirty="0" err="1" smtClean="0">
+              <a:rPr lang="es-PE" sz="1600" dirty="0" err="1">
                 <a:latin typeface="+mn-lt"/>
               </a:rPr>
               <a:t>NHibernate</a:t>
             </a:r>
             <a:r>
-              <a:rPr lang="es-PE" sz="1600" dirty="0" smtClean="0">
+              <a:rPr lang="es-PE" sz="1600" dirty="0">
                 <a:latin typeface="+mn-lt"/>
               </a:rPr>
               <a:t> </a:t>
@@ -17404,20 +17532,24 @@
               </a:rPr>
               <a:t>). </a:t>
             </a:r>
-            <a:endParaRPr lang="es-PE" sz="1600" dirty="0" smtClean="0">
-              <a:latin typeface="+mn-lt"/>
-            </a:endParaRPr>
-          </a:p>
-          <a:p>
-            <a:pPr algn="just"/>
             <a:endParaRPr lang="es-PE" sz="1600" dirty="0">
               <a:latin typeface="+mn-lt"/>
             </a:endParaRPr>
           </a:p>
           <a:p>
-            <a:pPr algn="just"/>
+            <a:pPr algn="just">
+              <a:defRPr/>
+            </a:pPr>
+            <a:endParaRPr lang="es-PE" sz="1600" dirty="0">
+              <a:latin typeface="+mn-lt"/>
+            </a:endParaRPr>
+          </a:p>
+          <a:p>
+            <a:pPr algn="just">
+              <a:defRPr/>
+            </a:pPr>
             <a:r>
-              <a:rPr lang="es-PE" sz="1600" dirty="0" smtClean="0">
+              <a:rPr lang="es-PE" sz="1600" dirty="0">
                 <a:latin typeface="+mn-lt"/>
               </a:rPr>
               <a:t>Un </a:t>
@@ -17429,7 +17561,7 @@
               <a:t>ORM permite abstraer el acceso a una base de datos relacional en una capa que resuelva el acceso a </a:t>
             </a:r>
             <a:r>
-              <a:rPr lang="es-PE" sz="1600" dirty="0" smtClean="0">
+              <a:rPr lang="es-PE" sz="1600" dirty="0">
                 <a:latin typeface="+mn-lt"/>
               </a:rPr>
               <a:t>datos.</a:t>
@@ -17441,11 +17573,6 @@
         </p:txBody>
       </p:sp>
     </p:spTree>
-    <p:extLst>
-      <p:ext uri="{BB962C8B-B14F-4D97-AF65-F5344CB8AC3E}">
-        <p14:creationId xmlns:p14="http://schemas.microsoft.com/office/powerpoint/2010/main" val="2810547816"/>
-      </p:ext>
-    </p:extLst>
   </p:cSld>
   <p:clrMapOvr>
     <a:masterClrMapping/>
@@ -17479,7 +17606,7 @@
       </p:grpSpPr>
       <p:sp>
         <p:nvSpPr>
-          <p:cNvPr id="3" name="2 Título"/>
+          <p:cNvPr id="29697" name="2 Título"/>
           <p:cNvSpPr txBox="1">
             <a:spLocks/>
           </p:cNvSpPr>
@@ -17502,9 +17629,7 @@
           </a:ln>
         </p:spPr>
         <p:txBody>
-          <a:bodyPr anchor="ctr">
-            <a:normAutofit/>
-          </a:bodyPr>
+          <a:bodyPr anchor="ctr"/>
           <a:lstStyle/>
           <a:p>
             <a:pPr algn="ctr">
@@ -17513,7 +17638,7 @@
               </a:lnSpc>
             </a:pPr>
             <a:r>
-              <a:rPr lang="es-PE" sz="3200" b="1" dirty="0" smtClean="0">
+              <a:rPr lang="es-PE" sz="3200" b="1">
                 <a:solidFill>
                   <a:srgbClr val="FFFFFF"/>
                 </a:solidFill>
@@ -17521,12 +17646,6 @@
               </a:rPr>
               <a:t>Mecanismos – Emisión de Reportes</a:t>
             </a:r>
-            <a:endParaRPr lang="es-PE" sz="3200" b="1" dirty="0">
-              <a:solidFill>
-                <a:srgbClr val="FFFFFF"/>
-              </a:solidFill>
-              <a:latin typeface="Candara" pitchFamily="34" charset="0"/>
-            </a:endParaRPr>
           </a:p>
         </p:txBody>
       </p:sp>
@@ -17538,8 +17657,8 @@
         </p:nvSpPr>
         <p:spPr>
           <a:xfrm>
-            <a:off x="323528" y="2708920"/>
-            <a:ext cx="3512976" cy="1815882"/>
+            <a:off x="323850" y="2708275"/>
+            <a:ext cx="3513138" cy="1816100"/>
           </a:xfrm>
           <a:prstGeom prst="rect">
             <a:avLst/>
@@ -17547,11 +17666,14 @@
           <a:noFill/>
         </p:spPr>
         <p:txBody>
-          <a:bodyPr wrap="square" rtlCol="0">
+          <a:bodyPr>
             <a:spAutoFit/>
           </a:bodyPr>
           <a:lstStyle/>
           <a:p>
+            <a:pPr>
+              <a:defRPr/>
+            </a:pPr>
             <a:r>
               <a:rPr lang="es-PE" sz="1600" b="1" dirty="0" err="1">
                 <a:latin typeface="+mn-lt"/>
@@ -17577,21 +17699,26 @@
               <a:t> para </a:t>
             </a:r>
             <a:r>
-              <a:rPr lang="es-PE" sz="1600" b="1" dirty="0" smtClean="0">
+              <a:rPr lang="es-PE" sz="1600" b="1" dirty="0">
                 <a:latin typeface="+mn-lt"/>
               </a:rPr>
               <a:t>ASP.net</a:t>
             </a:r>
           </a:p>
           <a:p>
+            <a:pPr>
+              <a:defRPr/>
+            </a:pPr>
             <a:endParaRPr lang="es-PE" sz="1600" b="1" dirty="0">
               <a:latin typeface="+mn-lt"/>
             </a:endParaRPr>
           </a:p>
           <a:p>
-            <a:pPr algn="just"/>
+            <a:pPr algn="just">
+              <a:defRPr/>
+            </a:pPr>
             <a:r>
-              <a:rPr lang="es-PE" sz="1600" dirty="0" smtClean="0">
+              <a:rPr lang="es-PE" sz="1600" dirty="0">
                 <a:latin typeface="+mn-lt"/>
               </a:rPr>
               <a:t>Es </a:t>
@@ -17603,7 +17730,7 @@
               <a:t>una herramienta de creación de informes que tiene la habilidad de entregar contenido enriquecido al monitor, a la impresora o a ficheros PDF, HTML, XLS, CSV y XML</a:t>
             </a:r>
             <a:r>
-              <a:rPr lang="es-PE" sz="1600" dirty="0" smtClean="0">
+              <a:rPr lang="es-PE" sz="1600" dirty="0">
                 <a:latin typeface="+mn-lt"/>
               </a:rPr>
               <a:t>.</a:t>
@@ -17616,20 +17743,14 @@
       </p:sp>
       <p:pic>
         <p:nvPicPr>
-          <p:cNvPr id="3074" name="Picture 2" descr="https://lh3.googleusercontent.com/2Qlq1boIRkGNsrwGIxWYsHCOFnKT2t3hrVdiaKK_fUMp9Gruu13ewujHjxyoEgqypi9R07wRb3Ow2w-bkMnjgAmYUOHReBjAnKAgbADO3_gtNuINq6I"/>
+          <p:cNvPr id="29699" name="Picture 2" descr="https://lh3.googleusercontent.com/2Qlq1boIRkGNsrwGIxWYsHCOFnKT2t3hrVdiaKK_fUMp9Gruu13ewujHjxyoEgqypi9R07wRb3Ow2w-bkMnjgAmYUOHReBjAnKAgbADO3_gtNuINq6I"/>
           <p:cNvPicPr>
             <a:picLocks noChangeAspect="1" noChangeArrowheads="1"/>
           </p:cNvPicPr>
           <p:nvPr/>
         </p:nvPicPr>
         <p:blipFill>
-          <a:blip r:embed="rId3">
-            <a:extLst>
-              <a:ext uri="{28A0092B-C50C-407E-A947-70E740481C1C}">
-                <a14:useLocalDpi xmlns:a14="http://schemas.microsoft.com/office/drawing/2010/main" val="0"/>
-              </a:ext>
-            </a:extLst>
-          </a:blip>
+          <a:blip r:embed="rId3"/>
           <a:srcRect/>
           <a:stretch>
             <a:fillRect/>
@@ -17637,30 +17758,22 @@
         </p:blipFill>
         <p:spPr bwMode="auto">
           <a:xfrm>
-            <a:off x="4368004" y="2492896"/>
-            <a:ext cx="4318796" cy="3563007"/>
+            <a:off x="4367213" y="2492375"/>
+            <a:ext cx="4319587" cy="3563938"/>
           </a:xfrm>
           <a:prstGeom prst="rect">
             <a:avLst/>
           </a:prstGeom>
           <a:noFill/>
-          <a:extLst>
-            <a:ext uri="{909E8E84-426E-40DD-AFC4-6F175D3DCCD1}">
-              <a14:hiddenFill xmlns:a14="http://schemas.microsoft.com/office/drawing/2010/main">
-                <a:solidFill>
-                  <a:srgbClr val="FFFFFF"/>
-                </a:solidFill>
-              </a14:hiddenFill>
-            </a:ext>
-          </a:extLst>
+          <a:ln w="9525">
+            <a:noFill/>
+            <a:miter lim="800000"/>
+            <a:headEnd/>
+            <a:tailEnd/>
+          </a:ln>
         </p:spPr>
       </p:pic>
     </p:spTree>
-    <p:extLst>
-      <p:ext uri="{BB962C8B-B14F-4D97-AF65-F5344CB8AC3E}">
-        <p14:creationId xmlns:p14="http://schemas.microsoft.com/office/powerpoint/2010/main" val="298619402"/>
-      </p:ext>
-    </p:extLst>
   </p:cSld>
   <p:clrMapOvr>
     <a:masterClrMapping/>
@@ -17694,7 +17807,7 @@
       </p:grpSpPr>
       <p:sp>
         <p:nvSpPr>
-          <p:cNvPr id="3" name="2 Título"/>
+          <p:cNvPr id="31745" name="2 Título"/>
           <p:cNvSpPr txBox="1">
             <a:spLocks/>
           </p:cNvSpPr>
@@ -17717,9 +17830,7 @@
           </a:ln>
         </p:spPr>
         <p:txBody>
-          <a:bodyPr anchor="ctr">
-            <a:normAutofit/>
-          </a:bodyPr>
+          <a:bodyPr anchor="ctr"/>
           <a:lstStyle/>
           <a:p>
             <a:pPr algn="ctr">
@@ -17728,7 +17839,7 @@
               </a:lnSpc>
             </a:pPr>
             <a:r>
-              <a:rPr lang="es-PE" sz="3200" b="1" dirty="0" smtClean="0">
+              <a:rPr lang="es-PE" sz="3200" b="1">
                 <a:solidFill>
                   <a:srgbClr val="FFFFFF"/>
                 </a:solidFill>
@@ -17736,12 +17847,6 @@
               </a:rPr>
               <a:t>Mecanismos – Manejo de errores</a:t>
             </a:r>
-            <a:endParaRPr lang="es-PE" sz="3200" b="1" dirty="0">
-              <a:solidFill>
-                <a:srgbClr val="FFFFFF"/>
-              </a:solidFill>
-              <a:latin typeface="Candara" pitchFamily="34" charset="0"/>
-            </a:endParaRPr>
           </a:p>
         </p:txBody>
       </p:sp>
@@ -17753,8 +17858,8 @@
         </p:nvSpPr>
         <p:spPr>
           <a:xfrm>
-            <a:off x="298510" y="2391266"/>
-            <a:ext cx="8521961" cy="4278094"/>
+            <a:off x="298450" y="2390775"/>
+            <a:ext cx="8521700" cy="4278313"/>
           </a:xfrm>
           <a:prstGeom prst="rect">
             <a:avLst/>
@@ -17762,14 +17867,16 @@
           <a:noFill/>
         </p:spPr>
         <p:txBody>
-          <a:bodyPr wrap="square" rtlCol="0">
+          <a:bodyPr>
             <a:spAutoFit/>
           </a:bodyPr>
           <a:lstStyle/>
           <a:p>
-            <a:pPr algn="just"/>
+            <a:pPr algn="just">
+              <a:defRPr/>
+            </a:pPr>
             <a:r>
-              <a:rPr lang="es-PE" sz="1600" dirty="0" smtClean="0">
+              <a:rPr lang="es-PE" sz="1600" dirty="0">
                 <a:latin typeface="+mn-lt"/>
               </a:rPr>
               <a:t>Se </a:t>
@@ -17794,7 +17901,9 @@
             </a:r>
           </a:p>
           <a:p>
-            <a:pPr algn="just"/>
+            <a:pPr algn="just">
+              <a:defRPr/>
+            </a:pPr>
             <a:r>
               <a:rPr lang="es-PE" sz="1600" dirty="0">
                 <a:latin typeface="+mn-lt"/>
@@ -17838,7 +17947,9 @@
             </a:r>
           </a:p>
           <a:p>
-            <a:pPr algn="just"/>
+            <a:pPr algn="just">
+              <a:defRPr/>
+            </a:pPr>
             <a:r>
               <a:rPr lang="es-PE" sz="1600" dirty="0">
                 <a:latin typeface="+mn-lt"/>
@@ -17882,7 +17993,9 @@
             </a:r>
           </a:p>
           <a:p>
-            <a:pPr algn="just"/>
+            <a:pPr algn="just">
+              <a:defRPr/>
+            </a:pPr>
             <a:r>
               <a:rPr lang="es-PE" sz="1600" dirty="0">
                 <a:latin typeface="+mn-lt"/>
@@ -17950,7 +18063,9 @@
             </a:r>
           </a:p>
           <a:p>
-            <a:pPr algn="just"/>
+            <a:pPr algn="just">
+              <a:defRPr/>
+            </a:pPr>
             <a:r>
               <a:rPr lang="es-PE" sz="1600" i="1" dirty="0">
                 <a:latin typeface="+mn-lt"/>
@@ -17989,7 +18104,9 @@
             </a:r>
           </a:p>
           <a:p>
-            <a:pPr algn="just"/>
+            <a:pPr algn="just">
+              <a:defRPr/>
+            </a:pPr>
             <a:r>
               <a:rPr lang="es-PE" sz="1600" i="1" dirty="0">
                 <a:latin typeface="+mn-lt"/>
@@ -18028,7 +18145,9 @@
             </a:r>
           </a:p>
           <a:p>
-            <a:pPr algn="just"/>
+            <a:pPr algn="just">
+              <a:defRPr/>
+            </a:pPr>
             <a:r>
               <a:rPr lang="es-PE" sz="1600" i="1" dirty="0">
                 <a:latin typeface="+mn-lt"/>
@@ -18055,7 +18174,9 @@
             </a:r>
           </a:p>
           <a:p>
-            <a:pPr algn="just"/>
+            <a:pPr algn="just">
+              <a:defRPr/>
+            </a:pPr>
             <a:r>
               <a:rPr lang="es-PE" sz="1600" dirty="0">
                 <a:latin typeface="+mn-lt"/>
@@ -18101,11 +18222,6 @@
         </p:txBody>
       </p:sp>
     </p:spTree>
-    <p:extLst>
-      <p:ext uri="{BB962C8B-B14F-4D97-AF65-F5344CB8AC3E}">
-        <p14:creationId xmlns:p14="http://schemas.microsoft.com/office/powerpoint/2010/main" val="961268542"/>
-      </p:ext>
-    </p:extLst>
   </p:cSld>
   <p:clrMapOvr>
     <a:masterClrMapping/>
@@ -18139,7 +18255,7 @@
       </p:grpSpPr>
       <p:sp>
         <p:nvSpPr>
-          <p:cNvPr id="16385" name="2 Título"/>
+          <p:cNvPr id="33793" name="2 Título"/>
           <p:cNvSpPr>
             <a:spLocks noGrp="1"/>
           </p:cNvSpPr>
@@ -18159,14 +18275,14 @@
           <a:p>
             <a:pPr eaLnBrk="1" hangingPunct="1"/>
             <a:r>
-              <a:rPr lang="en-US" b="1" dirty="0" smtClean="0">
+              <a:rPr lang="en-US" b="1" smtClean="0">
                 <a:solidFill>
                   <a:schemeClr val="tx2"/>
                 </a:solidFill>
               </a:rPr>
               <a:t>VISTA CONCEPTUAL</a:t>
             </a:r>
-            <a:endParaRPr lang="es-PE" b="1" dirty="0" smtClean="0">
+            <a:endParaRPr lang="es-PE" b="1" smtClean="0">
               <a:solidFill>
                 <a:schemeClr val="tx2"/>
               </a:solidFill>
@@ -18175,11 +18291,6 @@
         </p:txBody>
       </p:sp>
     </p:spTree>
-    <p:extLst>
-      <p:ext uri="{BB962C8B-B14F-4D97-AF65-F5344CB8AC3E}">
-        <p14:creationId xmlns:p14="http://schemas.microsoft.com/office/powerpoint/2010/main" val="4243572606"/>
-      </p:ext>
-    </p:extLst>
   </p:cSld>
   <p:clrMapOvr>
     <a:masterClrMapping/>
@@ -18213,7 +18324,7 @@
       </p:grpSpPr>
       <p:sp>
         <p:nvSpPr>
-          <p:cNvPr id="3" name="2 Título"/>
+          <p:cNvPr id="34817" name="2 Título"/>
           <p:cNvSpPr txBox="1">
             <a:spLocks/>
           </p:cNvSpPr>
@@ -18236,9 +18347,7 @@
           </a:ln>
         </p:spPr>
         <p:txBody>
-          <a:bodyPr anchor="ctr">
-            <a:normAutofit/>
-          </a:bodyPr>
+          <a:bodyPr anchor="ctr"/>
           <a:lstStyle/>
           <a:p>
             <a:pPr algn="ctr">
@@ -18247,7 +18356,7 @@
               </a:lnSpc>
             </a:pPr>
             <a:r>
-              <a:rPr lang="es-PE" sz="3200" b="1" dirty="0">
+              <a:rPr lang="es-PE" sz="3200" b="1">
                 <a:solidFill>
                   <a:srgbClr val="FFFFFF"/>
                 </a:solidFill>
@@ -18255,12 +18364,6 @@
               </a:rPr>
               <a:t>Vista Conceptual</a:t>
             </a:r>
-            <a:endParaRPr lang="es-PE" sz="3200" b="1" dirty="0">
-              <a:solidFill>
-                <a:srgbClr val="FFFFFF"/>
-              </a:solidFill>
-              <a:latin typeface="Candara" pitchFamily="34" charset="0"/>
-            </a:endParaRPr>
           </a:p>
         </p:txBody>
       </p:sp>
@@ -18272,8 +18375,8 @@
         </p:nvSpPr>
         <p:spPr>
           <a:xfrm>
-            <a:off x="457200" y="2538839"/>
-            <a:ext cx="4114800" cy="3293209"/>
+            <a:off x="457200" y="2538413"/>
+            <a:ext cx="4114800" cy="3294062"/>
           </a:xfrm>
           <a:prstGeom prst="rect">
             <a:avLst/>
@@ -18281,13 +18384,16 @@
           <a:noFill/>
         </p:spPr>
         <p:txBody>
-          <a:bodyPr wrap="square" rtlCol="0">
+          <a:bodyPr>
             <a:spAutoFit/>
           </a:bodyPr>
           <a:lstStyle/>
           <a:p>
+            <a:pPr>
+              <a:defRPr/>
+            </a:pPr>
             <a:r>
-              <a:rPr lang="es-PE" sz="1600" b="1" dirty="0" smtClean="0">
+              <a:rPr lang="es-PE" sz="1600" b="1" dirty="0">
                 <a:latin typeface="+mn-lt"/>
               </a:rPr>
               <a:t>Capa de presentación</a:t>
@@ -18300,9 +18406,10 @@
               </a:lnSpc>
               <a:buFont typeface="Arial" pitchFamily="34" charset="0"/>
               <a:buChar char="•"/>
+              <a:defRPr/>
             </a:pPr>
             <a:r>
-              <a:rPr lang="es-PE" sz="1600" dirty="0" smtClean="0">
+              <a:rPr lang="es-PE" sz="1600" dirty="0">
                 <a:latin typeface="+mn-lt"/>
               </a:rPr>
               <a:t>Mostrar </a:t>
@@ -18314,7 +18421,7 @@
               <a:t>tablero de </a:t>
             </a:r>
             <a:r>
-              <a:rPr lang="es-PE" sz="1600" dirty="0" smtClean="0">
+              <a:rPr lang="es-PE" sz="1600" dirty="0">
                 <a:latin typeface="+mn-lt"/>
               </a:rPr>
               <a:t>mando.</a:t>
@@ -18330,6 +18437,7 @@
               </a:lnSpc>
               <a:buFont typeface="Arial" pitchFamily="34" charset="0"/>
               <a:buChar char="•"/>
+              <a:defRPr/>
             </a:pPr>
             <a:r>
               <a:rPr lang="es-PE" sz="1600" dirty="0">
@@ -18338,7 +18446,7 @@
               <a:t>Mostrar </a:t>
             </a:r>
             <a:r>
-              <a:rPr lang="es-PE" sz="1600" dirty="0" smtClean="0">
+              <a:rPr lang="es-PE" sz="1600" dirty="0">
                 <a:latin typeface="+mn-lt"/>
               </a:rPr>
               <a:t>reportes.</a:t>
@@ -18354,6 +18462,7 @@
               </a:lnSpc>
               <a:buFont typeface="Arial" pitchFamily="34" charset="0"/>
               <a:buChar char="•"/>
+              <a:defRPr/>
             </a:pPr>
             <a:r>
               <a:rPr lang="es-PE" sz="1600" dirty="0">
@@ -18362,13 +18471,13 @@
               <a:t>Mostrar páginas </a:t>
             </a:r>
             <a:r>
-              <a:rPr lang="es-PE" sz="1600" dirty="0" err="1" smtClean="0">
+              <a:rPr lang="es-PE" sz="1600" dirty="0" err="1">
                 <a:latin typeface="+mn-lt"/>
               </a:rPr>
               <a:t>aspx</a:t>
             </a:r>
             <a:r>
-              <a:rPr lang="es-PE" sz="1600" dirty="0" smtClean="0">
+              <a:rPr lang="es-PE" sz="1600" dirty="0">
                 <a:latin typeface="+mn-lt"/>
               </a:rPr>
               <a:t>.</a:t>
@@ -18384,6 +18493,7 @@
               </a:lnSpc>
               <a:buFont typeface="Arial" pitchFamily="34" charset="0"/>
               <a:buChar char="•"/>
+              <a:defRPr/>
             </a:pPr>
             <a:r>
               <a:rPr lang="es-PE" sz="1600" dirty="0">
@@ -18411,6 +18521,7 @@
               </a:lnSpc>
               <a:buFont typeface="Arial" pitchFamily="34" charset="0"/>
               <a:buChar char="•"/>
+              <a:defRPr/>
             </a:pPr>
             <a:r>
               <a:rPr lang="es-PE" sz="1600" dirty="0">
@@ -18419,7 +18530,7 @@
               <a:t>Usar hora de </a:t>
             </a:r>
             <a:r>
-              <a:rPr lang="es-PE" sz="1600" dirty="0" smtClean="0">
+              <a:rPr lang="es-PE" sz="1600" dirty="0">
                 <a:latin typeface="+mn-lt"/>
               </a:rPr>
               <a:t>estilos.</a:t>
@@ -18435,6 +18546,7 @@
               </a:lnSpc>
               <a:buFont typeface="Arial" pitchFamily="34" charset="0"/>
               <a:buChar char="•"/>
+              <a:defRPr/>
             </a:pPr>
             <a:r>
               <a:rPr lang="es-PE" sz="1600" dirty="0">
@@ -18443,7 +18555,7 @@
               <a:t>Validaciones de datos en formularios, validación de datos </a:t>
             </a:r>
             <a:r>
-              <a:rPr lang="es-PE" sz="1600" dirty="0" smtClean="0">
+              <a:rPr lang="es-PE" sz="1600" dirty="0">
                 <a:latin typeface="+mn-lt"/>
               </a:rPr>
               <a:t>obligatorios.</a:t>
@@ -18456,20 +18568,14 @@
       </p:sp>
       <p:pic>
         <p:nvPicPr>
-          <p:cNvPr id="4098" name="Picture 2" descr="https://lh5.googleusercontent.com/DdA1zp9yJVb1tXiFHQr3hlHLLqszmg6KW9dNnvuduFauJwGIzCxsp8tPLKKrQgUWylO5-2lOf7vzzg2fwHBX95cY9Sgo2w3CoFtN_omunCLf9Si-sA"/>
+          <p:cNvPr id="34819" name="Picture 2" descr="https://lh5.googleusercontent.com/DdA1zp9yJVb1tXiFHQr3hlHLLqszmg6KW9dNnvuduFauJwGIzCxsp8tPLKKrQgUWylO5-2lOf7vzzg2fwHBX95cY9Sgo2w3CoFtN_omunCLf9Si-sA"/>
           <p:cNvPicPr>
             <a:picLocks noChangeAspect="1" noChangeArrowheads="1"/>
           </p:cNvPicPr>
           <p:nvPr/>
         </p:nvPicPr>
         <p:blipFill>
-          <a:blip r:embed="rId3">
-            <a:extLst>
-              <a:ext uri="{28A0092B-C50C-407E-A947-70E740481C1C}">
-                <a14:useLocalDpi xmlns:a14="http://schemas.microsoft.com/office/drawing/2010/main" val="0"/>
-              </a:ext>
-            </a:extLst>
-          </a:blip>
+          <a:blip r:embed="rId3"/>
           <a:srcRect/>
           <a:stretch>
             <a:fillRect/>
@@ -18477,30 +18583,22 @@
         </p:blipFill>
         <p:spPr bwMode="auto">
           <a:xfrm>
-            <a:off x="5148063" y="2553419"/>
+            <a:off x="5148263" y="2552700"/>
             <a:ext cx="3190875" cy="3971925"/>
           </a:xfrm>
           <a:prstGeom prst="rect">
             <a:avLst/>
           </a:prstGeom>
           <a:noFill/>
-          <a:extLst>
-            <a:ext uri="{909E8E84-426E-40DD-AFC4-6F175D3DCCD1}">
-              <a14:hiddenFill xmlns:a14="http://schemas.microsoft.com/office/drawing/2010/main">
-                <a:solidFill>
-                  <a:srgbClr val="FFFFFF"/>
-                </a:solidFill>
-              </a14:hiddenFill>
-            </a:ext>
-          </a:extLst>
+          <a:ln w="9525">
+            <a:noFill/>
+            <a:miter lim="800000"/>
+            <a:headEnd/>
+            <a:tailEnd/>
+          </a:ln>
         </p:spPr>
       </p:pic>
     </p:spTree>
-    <p:extLst>
-      <p:ext uri="{BB962C8B-B14F-4D97-AF65-F5344CB8AC3E}">
-        <p14:creationId xmlns:p14="http://schemas.microsoft.com/office/powerpoint/2010/main" val="116496091"/>
-      </p:ext>
-    </p:extLst>
   </p:cSld>
   <p:clrMapOvr>
     <a:masterClrMapping/>
@@ -18534,7 +18632,7 @@
       </p:grpSpPr>
       <p:sp>
         <p:nvSpPr>
-          <p:cNvPr id="3" name="2 Título"/>
+          <p:cNvPr id="36865" name="2 Título"/>
           <p:cNvSpPr txBox="1">
             <a:spLocks/>
           </p:cNvSpPr>
@@ -18542,7 +18640,7 @@
         </p:nvSpPr>
         <p:spPr bwMode="auto">
           <a:xfrm>
-            <a:off x="454698" y="338138"/>
+            <a:off x="454025" y="338138"/>
             <a:ext cx="8229600" cy="1252537"/>
           </a:xfrm>
           <a:prstGeom prst="rect">
@@ -18557,9 +18655,7 @@
           </a:ln>
         </p:spPr>
         <p:txBody>
-          <a:bodyPr anchor="ctr">
-            <a:normAutofit/>
-          </a:bodyPr>
+          <a:bodyPr anchor="ctr"/>
           <a:lstStyle/>
           <a:p>
             <a:pPr algn="ctr">
@@ -18568,7 +18664,7 @@
               </a:lnSpc>
             </a:pPr>
             <a:r>
-              <a:rPr lang="es-PE" sz="3200" b="1" dirty="0" smtClean="0">
+              <a:rPr lang="es-PE" sz="3200" b="1">
                 <a:solidFill>
                   <a:srgbClr val="FFFFFF"/>
                 </a:solidFill>
@@ -18576,12 +18672,6 @@
               </a:rPr>
               <a:t>Vista Conceptual</a:t>
             </a:r>
-            <a:endParaRPr lang="es-PE" sz="3200" b="1" dirty="0">
-              <a:solidFill>
-                <a:srgbClr val="FFFFFF"/>
-              </a:solidFill>
-              <a:latin typeface="Candara" pitchFamily="34" charset="0"/>
-            </a:endParaRPr>
           </a:p>
         </p:txBody>
       </p:sp>
@@ -18593,8 +18683,8 @@
         </p:nvSpPr>
         <p:spPr>
           <a:xfrm>
-            <a:off x="457200" y="1929021"/>
-            <a:ext cx="4464496" cy="4524315"/>
+            <a:off x="457200" y="1928813"/>
+            <a:ext cx="4464050" cy="4524375"/>
           </a:xfrm>
           <a:prstGeom prst="rect">
             <a:avLst/>
@@ -18602,13 +18692,16 @@
           <a:noFill/>
         </p:spPr>
         <p:txBody>
-          <a:bodyPr wrap="square" rtlCol="0">
+          <a:bodyPr>
             <a:spAutoFit/>
           </a:bodyPr>
           <a:lstStyle/>
           <a:p>
+            <a:pPr>
+              <a:defRPr/>
+            </a:pPr>
             <a:r>
-              <a:rPr lang="es-PE" sz="1600" b="1" dirty="0" smtClean="0">
+              <a:rPr lang="es-PE" sz="1600" b="1" dirty="0">
                 <a:latin typeface="+mn-lt"/>
               </a:rPr>
               <a:t>Capa de negocio</a:t>
@@ -18621,9 +18714,10 @@
               </a:lnSpc>
               <a:buFont typeface="Arial" pitchFamily="34" charset="0"/>
               <a:buChar char="•"/>
+              <a:defRPr/>
             </a:pPr>
             <a:r>
-              <a:rPr lang="es-PE" sz="1600" dirty="0" smtClean="0">
+              <a:rPr lang="es-PE" sz="1600" dirty="0">
                 <a:latin typeface="+mn-lt"/>
               </a:rPr>
               <a:t>Reglas de negocio</a:t>
@@ -18639,9 +18733,10 @@
               </a:lnSpc>
               <a:buFont typeface="Arial" pitchFamily="34" charset="0"/>
               <a:buChar char="•"/>
+              <a:defRPr/>
             </a:pPr>
             <a:r>
-              <a:rPr lang="es-PE" sz="1600" dirty="0" smtClean="0">
+              <a:rPr lang="es-PE" sz="1600" dirty="0">
                 <a:latin typeface="+mn-lt"/>
               </a:rPr>
               <a:t>Entidades de negocio</a:t>
@@ -18657,9 +18752,10 @@
               </a:lnSpc>
               <a:buFont typeface="Arial" pitchFamily="34" charset="0"/>
               <a:buChar char="•"/>
+              <a:defRPr/>
             </a:pPr>
             <a:r>
-              <a:rPr lang="es-PE" sz="1600" dirty="0" smtClean="0">
+              <a:rPr lang="es-PE" sz="1600" dirty="0">
                 <a:latin typeface="+mn-lt"/>
               </a:rPr>
               <a:t>Validaciones de datos</a:t>
@@ -18675,9 +18771,10 @@
               </a:lnSpc>
               <a:buFont typeface="Arial" pitchFamily="34" charset="0"/>
               <a:buChar char="•"/>
+              <a:defRPr/>
             </a:pPr>
             <a:r>
-              <a:rPr lang="es-PE" sz="1600" dirty="0" smtClean="0">
+              <a:rPr lang="es-PE" sz="1600" dirty="0">
                 <a:latin typeface="+mn-lt"/>
               </a:rPr>
               <a:t>Flujos y procesos</a:t>
@@ -18693,20 +18790,21 @@
               </a:lnSpc>
               <a:buFont typeface="Arial" pitchFamily="34" charset="0"/>
               <a:buChar char="•"/>
+              <a:defRPr/>
             </a:pPr>
             <a:r>
-              <a:rPr lang="es-PE" sz="1600" dirty="0" smtClean="0">
+              <a:rPr lang="es-PE" sz="1600" dirty="0">
                 <a:latin typeface="+mn-lt"/>
               </a:rPr>
               <a:t>Net </a:t>
             </a:r>
             <a:r>
-              <a:rPr lang="es-PE" sz="1600" dirty="0" err="1" smtClean="0">
+              <a:rPr lang="es-PE" sz="1600" dirty="0" err="1">
                 <a:latin typeface="+mn-lt"/>
               </a:rPr>
               <a:t>remoting</a:t>
             </a:r>
-            <a:endParaRPr lang="es-PE" sz="1600" dirty="0" smtClean="0">
+            <a:endParaRPr lang="es-PE" sz="1600" dirty="0">
               <a:latin typeface="+mn-lt"/>
             </a:endParaRPr>
           </a:p>
@@ -18714,13 +18812,16 @@
             <a:pPr marL="285750" indent="-285750" algn="just">
               <a:buFont typeface="Arial" pitchFamily="34" charset="0"/>
               <a:buChar char="•"/>
+              <a:defRPr/>
             </a:pPr>
             <a:endParaRPr lang="en-US" sz="1600" dirty="0">
               <a:latin typeface="+mn-lt"/>
             </a:endParaRPr>
           </a:p>
           <a:p>
-            <a:pPr algn="just"/>
+            <a:pPr algn="just">
+              <a:defRPr/>
+            </a:pPr>
             <a:r>
               <a:rPr lang="es-PE" sz="1600" b="1" dirty="0">
                 <a:latin typeface="+mn-lt"/>
@@ -18728,7 +18829,7 @@
               <a:t>Capa de </a:t>
             </a:r>
             <a:r>
-              <a:rPr lang="es-PE" sz="1600" b="1" dirty="0" smtClean="0">
+              <a:rPr lang="es-PE" sz="1600" b="1" dirty="0">
                 <a:latin typeface="+mn-lt"/>
               </a:rPr>
               <a:t>datos</a:t>
@@ -18741,9 +18842,10 @@
               </a:lnSpc>
               <a:buFont typeface="Arial" pitchFamily="34" charset="0"/>
               <a:buChar char="•"/>
+              <a:defRPr/>
             </a:pPr>
             <a:r>
-              <a:rPr lang="en-US" sz="1600" dirty="0" smtClean="0">
+              <a:rPr lang="en-US" sz="1600" dirty="0">
                 <a:latin typeface="+mn-lt"/>
               </a:rPr>
               <a:t>Microsoft </a:t>
@@ -18762,6 +18864,7 @@
               </a:lnSpc>
               <a:buFont typeface="Arial" pitchFamily="34" charset="0"/>
               <a:buChar char="•"/>
+              <a:defRPr/>
             </a:pPr>
             <a:r>
               <a:rPr lang="en-US" sz="1600" dirty="0">
@@ -18786,6 +18889,7 @@
               </a:lnSpc>
               <a:buFont typeface="Arial" pitchFamily="34" charset="0"/>
               <a:buChar char="•"/>
+              <a:defRPr/>
             </a:pPr>
             <a:r>
               <a:rPr lang="en-US" sz="1600" dirty="0" err="1">
@@ -18816,6 +18920,7 @@
               </a:lnSpc>
               <a:buFont typeface="Arial" pitchFamily="34" charset="0"/>
               <a:buChar char="•"/>
+              <a:defRPr/>
             </a:pPr>
             <a:r>
               <a:rPr lang="en-US" sz="1600" dirty="0" err="1">
@@ -18834,6 +18939,7 @@
               </a:lnSpc>
               <a:buFont typeface="Arial" pitchFamily="34" charset="0"/>
               <a:buChar char="•"/>
+              <a:defRPr/>
             </a:pPr>
             <a:r>
               <a:rPr lang="en-US" sz="1600" dirty="0" err="1">
@@ -18855,20 +18961,14 @@
       </p:sp>
       <p:pic>
         <p:nvPicPr>
-          <p:cNvPr id="4098" name="Picture 2" descr="https://lh5.googleusercontent.com/DdA1zp9yJVb1tXiFHQr3hlHLLqszmg6KW9dNnvuduFauJwGIzCxsp8tPLKKrQgUWylO5-2lOf7vzzg2fwHBX95cY9Sgo2w3CoFtN_omunCLf9Si-sA"/>
+          <p:cNvPr id="36867" name="Picture 2" descr="https://lh5.googleusercontent.com/DdA1zp9yJVb1tXiFHQr3hlHLLqszmg6KW9dNnvuduFauJwGIzCxsp8tPLKKrQgUWylO5-2lOf7vzzg2fwHBX95cY9Sgo2w3CoFtN_omunCLf9Si-sA"/>
           <p:cNvPicPr>
             <a:picLocks noChangeAspect="1" noChangeArrowheads="1"/>
           </p:cNvPicPr>
           <p:nvPr/>
         </p:nvPicPr>
         <p:blipFill>
-          <a:blip r:embed="rId3">
-            <a:extLst>
-              <a:ext uri="{28A0092B-C50C-407E-A947-70E740481C1C}">
-                <a14:useLocalDpi xmlns:a14="http://schemas.microsoft.com/office/drawing/2010/main" val="0"/>
-              </a:ext>
-            </a:extLst>
-          </a:blip>
+          <a:blip r:embed="rId3"/>
           <a:srcRect/>
           <a:stretch>
             <a:fillRect/>
@@ -18876,30 +18976,22 @@
         </p:blipFill>
         <p:spPr bwMode="auto">
           <a:xfrm>
-            <a:off x="5148063" y="2564904"/>
+            <a:off x="5148263" y="2565400"/>
             <a:ext cx="3190875" cy="3971925"/>
           </a:xfrm>
           <a:prstGeom prst="rect">
             <a:avLst/>
           </a:prstGeom>
           <a:noFill/>
-          <a:extLst>
-            <a:ext uri="{909E8E84-426E-40DD-AFC4-6F175D3DCCD1}">
-              <a14:hiddenFill xmlns:a14="http://schemas.microsoft.com/office/drawing/2010/main">
-                <a:solidFill>
-                  <a:srgbClr val="FFFFFF"/>
-                </a:solidFill>
-              </a14:hiddenFill>
-            </a:ext>
-          </a:extLst>
+          <a:ln w="9525">
+            <a:noFill/>
+            <a:miter lim="800000"/>
+            <a:headEnd/>
+            <a:tailEnd/>
+          </a:ln>
         </p:spPr>
       </p:pic>
     </p:spTree>
-    <p:extLst>
-      <p:ext uri="{BB962C8B-B14F-4D97-AF65-F5344CB8AC3E}">
-        <p14:creationId xmlns:p14="http://schemas.microsoft.com/office/powerpoint/2010/main" val="1183184348"/>
-      </p:ext>
-    </p:extLst>
   </p:cSld>
   <p:clrMapOvr>
     <a:masterClrMapping/>
@@ -18933,7 +19025,7 @@
       </p:grpSpPr>
       <p:sp>
         <p:nvSpPr>
-          <p:cNvPr id="16385" name="2 Título"/>
+          <p:cNvPr id="38913" name="2 Título"/>
           <p:cNvSpPr>
             <a:spLocks noGrp="1"/>
           </p:cNvSpPr>
@@ -18953,14 +19045,14 @@
           <a:p>
             <a:pPr eaLnBrk="1" hangingPunct="1"/>
             <a:r>
-              <a:rPr lang="en-US" b="1" dirty="0" smtClean="0">
+              <a:rPr lang="en-US" b="1" smtClean="0">
                 <a:solidFill>
                   <a:schemeClr val="tx2"/>
                 </a:solidFill>
               </a:rPr>
               <a:t>VISTA LOGICA</a:t>
             </a:r>
-            <a:endParaRPr lang="es-PE" b="1" dirty="0" smtClean="0">
+            <a:endParaRPr lang="es-PE" b="1" smtClean="0">
               <a:solidFill>
                 <a:schemeClr val="tx2"/>
               </a:solidFill>
@@ -18969,11 +19061,6 @@
         </p:txBody>
       </p:sp>
     </p:spTree>
-    <p:extLst>
-      <p:ext uri="{BB962C8B-B14F-4D97-AF65-F5344CB8AC3E}">
-        <p14:creationId xmlns:p14="http://schemas.microsoft.com/office/powerpoint/2010/main" val="3838439124"/>
-      </p:ext>
-    </p:extLst>
   </p:cSld>
   <p:clrMapOvr>
     <a:masterClrMapping/>
@@ -19007,7 +19094,7 @@
       </p:grpSpPr>
       <p:sp>
         <p:nvSpPr>
-          <p:cNvPr id="3" name="2 Título"/>
+          <p:cNvPr id="39937" name="2 Título"/>
           <p:cNvSpPr txBox="1">
             <a:spLocks/>
           </p:cNvSpPr>
@@ -19015,8 +19102,8 @@
         </p:nvSpPr>
         <p:spPr bwMode="auto">
           <a:xfrm>
-            <a:off x="454698" y="338137"/>
-            <a:ext cx="8229600" cy="1002631"/>
+            <a:off x="454025" y="338138"/>
+            <a:ext cx="8229600" cy="1003300"/>
           </a:xfrm>
           <a:prstGeom prst="rect">
             <a:avLst/>
@@ -19030,9 +19117,7 @@
           </a:ln>
         </p:spPr>
         <p:txBody>
-          <a:bodyPr anchor="ctr">
-            <a:normAutofit/>
-          </a:bodyPr>
+          <a:bodyPr anchor="ctr"/>
           <a:lstStyle/>
           <a:p>
             <a:pPr algn="ctr">
@@ -19041,7 +19126,7 @@
               </a:lnSpc>
             </a:pPr>
             <a:r>
-              <a:rPr lang="es-PE" sz="3200" b="1" dirty="0" smtClean="0">
+              <a:rPr lang="es-PE" sz="3200" b="1">
                 <a:solidFill>
                   <a:srgbClr val="FFFFFF"/>
                 </a:solidFill>
@@ -19049,51 +19134,42 @@
               </a:rPr>
               <a:t>Vista lógica</a:t>
             </a:r>
-            <a:endParaRPr lang="es-PE" sz="3200" b="1" dirty="0">
-              <a:solidFill>
-                <a:srgbClr val="FFFFFF"/>
-              </a:solidFill>
-              <a:latin typeface="Candara" pitchFamily="34" charset="0"/>
-            </a:endParaRPr>
           </a:p>
         </p:txBody>
       </p:sp>
       <p:pic>
         <p:nvPicPr>
-          <p:cNvPr id="6" name="5 Imagen"/>
+          <p:cNvPr id="39938" name="5 Imagen"/>
           <p:cNvPicPr>
             <a:picLocks noChangeAspect="1"/>
           </p:cNvPicPr>
           <p:nvPr/>
         </p:nvPicPr>
         <p:blipFill>
-          <a:blip r:embed="rId3">
-            <a:extLst>
-              <a:ext uri="{28A0092B-C50C-407E-A947-70E740481C1C}">
-                <a14:useLocalDpi xmlns:a14="http://schemas.microsoft.com/office/drawing/2010/main" val="0"/>
-              </a:ext>
-            </a:extLst>
-          </a:blip>
+          <a:blip r:embed="rId3"/>
+          <a:srcRect/>
           <a:stretch>
             <a:fillRect/>
           </a:stretch>
         </p:blipFill>
-        <p:spPr>
+        <p:spPr bwMode="auto">
           <a:xfrm>
-            <a:off x="933094" y="1340768"/>
-            <a:ext cx="7272808" cy="5226110"/>
+            <a:off x="933450" y="1341438"/>
+            <a:ext cx="7272338" cy="5226050"/>
           </a:xfrm>
           <a:prstGeom prst="rect">
             <a:avLst/>
           </a:prstGeom>
+          <a:noFill/>
+          <a:ln w="9525">
+            <a:noFill/>
+            <a:miter lim="800000"/>
+            <a:headEnd/>
+            <a:tailEnd/>
+          </a:ln>
         </p:spPr>
       </p:pic>
     </p:spTree>
-    <p:extLst>
-      <p:ext uri="{BB962C8B-B14F-4D97-AF65-F5344CB8AC3E}">
-        <p14:creationId xmlns:p14="http://schemas.microsoft.com/office/powerpoint/2010/main" val="1183184348"/>
-      </p:ext>
-    </p:extLst>
   </p:cSld>
   <p:clrMapOvr>
     <a:masterClrMapping/>
@@ -19127,7 +19203,7 @@
       </p:grpSpPr>
       <p:sp>
         <p:nvSpPr>
-          <p:cNvPr id="16385" name="2 Título"/>
+          <p:cNvPr id="41985" name="2 Título"/>
           <p:cNvSpPr>
             <a:spLocks noGrp="1"/>
           </p:cNvSpPr>
@@ -19147,14 +19223,14 @@
           <a:p>
             <a:pPr eaLnBrk="1" hangingPunct="1"/>
             <a:r>
-              <a:rPr lang="en-US" b="1" dirty="0" smtClean="0">
+              <a:rPr lang="en-US" b="1" smtClean="0">
                 <a:solidFill>
                   <a:schemeClr val="tx2"/>
                 </a:solidFill>
               </a:rPr>
               <a:t>VISTA IMPLEMENTACION</a:t>
             </a:r>
-            <a:endParaRPr lang="es-PE" b="1" dirty="0" smtClean="0">
+            <a:endParaRPr lang="es-PE" b="1" smtClean="0">
               <a:solidFill>
                 <a:schemeClr val="tx2"/>
               </a:solidFill>
@@ -19163,11 +19239,6 @@
         </p:txBody>
       </p:sp>
     </p:spTree>
-    <p:extLst>
-      <p:ext uri="{BB962C8B-B14F-4D97-AF65-F5344CB8AC3E}">
-        <p14:creationId xmlns:p14="http://schemas.microsoft.com/office/powerpoint/2010/main" val="4225383131"/>
-      </p:ext>
-    </p:extLst>
   </p:cSld>
   <p:clrMapOvr>
     <a:masterClrMapping/>
@@ -19201,7 +19272,7 @@
       </p:grpSpPr>
       <p:sp>
         <p:nvSpPr>
-          <p:cNvPr id="3" name="2 Título"/>
+          <p:cNvPr id="43009" name="2 Título"/>
           <p:cNvSpPr txBox="1">
             <a:spLocks/>
           </p:cNvSpPr>
@@ -19209,7 +19280,7 @@
         </p:nvSpPr>
         <p:spPr bwMode="auto">
           <a:xfrm>
-            <a:off x="454698" y="338138"/>
+            <a:off x="454025" y="338138"/>
             <a:ext cx="8229600" cy="1252537"/>
           </a:xfrm>
           <a:prstGeom prst="rect">
@@ -19224,9 +19295,7 @@
           </a:ln>
         </p:spPr>
         <p:txBody>
-          <a:bodyPr anchor="ctr">
-            <a:normAutofit/>
-          </a:bodyPr>
+          <a:bodyPr anchor="ctr"/>
           <a:lstStyle/>
           <a:p>
             <a:pPr algn="ctr">
@@ -19235,7 +19304,7 @@
               </a:lnSpc>
             </a:pPr>
             <a:r>
-              <a:rPr lang="es-PE" sz="3200" b="1" dirty="0" smtClean="0">
+              <a:rPr lang="es-PE" sz="3200" b="1">
                 <a:solidFill>
                   <a:srgbClr val="FFFFFF"/>
                 </a:solidFill>
@@ -19243,51 +19312,42 @@
               </a:rPr>
               <a:t>Vista de implementación – Solicitud de Contratos</a:t>
             </a:r>
-            <a:endParaRPr lang="es-PE" sz="3200" b="1" dirty="0">
-              <a:solidFill>
-                <a:srgbClr val="FFFFFF"/>
-              </a:solidFill>
-              <a:latin typeface="Candara" pitchFamily="34" charset="0"/>
-            </a:endParaRPr>
           </a:p>
         </p:txBody>
       </p:sp>
       <p:pic>
         <p:nvPicPr>
-          <p:cNvPr id="2" name="1 Imagen"/>
+          <p:cNvPr id="43010" name="1 Imagen"/>
           <p:cNvPicPr>
             <a:picLocks noChangeAspect="1"/>
           </p:cNvPicPr>
           <p:nvPr/>
         </p:nvPicPr>
         <p:blipFill>
-          <a:blip r:embed="rId3">
-            <a:extLst>
-              <a:ext uri="{28A0092B-C50C-407E-A947-70E740481C1C}">
-                <a14:useLocalDpi xmlns:a14="http://schemas.microsoft.com/office/drawing/2010/main" val="0"/>
-              </a:ext>
-            </a:extLst>
-          </a:blip>
+          <a:blip r:embed="rId3"/>
+          <a:srcRect/>
           <a:stretch>
             <a:fillRect/>
           </a:stretch>
         </p:blipFill>
-        <p:spPr>
+        <p:spPr bwMode="auto">
           <a:xfrm>
-            <a:off x="1475656" y="1590675"/>
-            <a:ext cx="6572027" cy="4774231"/>
+            <a:off x="1476375" y="1590675"/>
+            <a:ext cx="6570663" cy="4773613"/>
           </a:xfrm>
           <a:prstGeom prst="rect">
             <a:avLst/>
           </a:prstGeom>
+          <a:noFill/>
+          <a:ln w="9525">
+            <a:noFill/>
+            <a:miter lim="800000"/>
+            <a:headEnd/>
+            <a:tailEnd/>
+          </a:ln>
         </p:spPr>
       </p:pic>
     </p:spTree>
-    <p:extLst>
-      <p:ext uri="{BB962C8B-B14F-4D97-AF65-F5344CB8AC3E}">
-        <p14:creationId xmlns:p14="http://schemas.microsoft.com/office/powerpoint/2010/main" val="1775792673"/>
-      </p:ext>
-    </p:extLst>
   </p:cSld>
   <p:clrMapOvr>
     <a:masterClrMapping/>
@@ -19341,18 +19401,13 @@
           <a:p>
             <a:pPr eaLnBrk="1" hangingPunct="1"/>
             <a:r>
-              <a:rPr lang="es-PE" b="1" dirty="0" smtClean="0">
+              <a:rPr lang="es-PE" b="1" smtClean="0">
                 <a:solidFill>
                   <a:schemeClr val="tx2"/>
                 </a:solidFill>
               </a:rPr>
               <a:t>ARQUITECTURA DE SOFTWARE</a:t>
             </a:r>
-            <a:endParaRPr lang="es-PE" b="1" dirty="0" smtClean="0">
-              <a:solidFill>
-                <a:schemeClr val="tx2"/>
-              </a:solidFill>
-            </a:endParaRPr>
           </a:p>
         </p:txBody>
       </p:sp>
@@ -19390,7 +19445,7 @@
       </p:grpSpPr>
       <p:sp>
         <p:nvSpPr>
-          <p:cNvPr id="3" name="2 Título"/>
+          <p:cNvPr id="45057" name="2 Título"/>
           <p:cNvSpPr txBox="1">
             <a:spLocks/>
           </p:cNvSpPr>
@@ -19398,7 +19453,7 @@
         </p:nvSpPr>
         <p:spPr bwMode="auto">
           <a:xfrm>
-            <a:off x="454698" y="338138"/>
+            <a:off x="454025" y="338138"/>
             <a:ext cx="8229600" cy="1252537"/>
           </a:xfrm>
           <a:prstGeom prst="rect">
@@ -19413,9 +19468,7 @@
           </a:ln>
         </p:spPr>
         <p:txBody>
-          <a:bodyPr anchor="ctr">
-            <a:normAutofit/>
-          </a:bodyPr>
+          <a:bodyPr anchor="ctr"/>
           <a:lstStyle/>
           <a:p>
             <a:pPr algn="ctr">
@@ -19424,7 +19477,7 @@
               </a:lnSpc>
             </a:pPr>
             <a:r>
-              <a:rPr lang="es-PE" sz="3200" b="1" dirty="0" smtClean="0">
+              <a:rPr lang="es-PE" sz="3200" b="1">
                 <a:solidFill>
                   <a:srgbClr val="FFFFFF"/>
                 </a:solidFill>
@@ -19432,51 +19485,42 @@
               </a:rPr>
               <a:t>Vista de implementación – Seguimiento de Contratos</a:t>
             </a:r>
-            <a:endParaRPr lang="es-PE" sz="3200" b="1" dirty="0">
-              <a:solidFill>
-                <a:srgbClr val="FFFFFF"/>
-              </a:solidFill>
-              <a:latin typeface="Candara" pitchFamily="34" charset="0"/>
-            </a:endParaRPr>
           </a:p>
         </p:txBody>
       </p:sp>
       <p:pic>
         <p:nvPicPr>
-          <p:cNvPr id="4" name="3 Imagen"/>
+          <p:cNvPr id="45058" name="3 Imagen"/>
           <p:cNvPicPr>
             <a:picLocks noChangeAspect="1"/>
           </p:cNvPicPr>
           <p:nvPr/>
         </p:nvPicPr>
         <p:blipFill>
-          <a:blip r:embed="rId3">
-            <a:extLst>
-              <a:ext uri="{28A0092B-C50C-407E-A947-70E740481C1C}">
-                <a14:useLocalDpi xmlns:a14="http://schemas.microsoft.com/office/drawing/2010/main" val="0"/>
-              </a:ext>
-            </a:extLst>
-          </a:blip>
+          <a:blip r:embed="rId3"/>
+          <a:srcRect/>
           <a:stretch>
             <a:fillRect/>
           </a:stretch>
         </p:blipFill>
-        <p:spPr>
+        <p:spPr bwMode="auto">
           <a:xfrm>
-            <a:off x="1403648" y="1484784"/>
-            <a:ext cx="6264695" cy="5234501"/>
+            <a:off x="1403350" y="1484313"/>
+            <a:ext cx="6264275" cy="5235575"/>
           </a:xfrm>
           <a:prstGeom prst="rect">
             <a:avLst/>
           </a:prstGeom>
+          <a:noFill/>
+          <a:ln w="9525">
+            <a:noFill/>
+            <a:miter lim="800000"/>
+            <a:headEnd/>
+            <a:tailEnd/>
+          </a:ln>
         </p:spPr>
       </p:pic>
     </p:spTree>
-    <p:extLst>
-      <p:ext uri="{BB962C8B-B14F-4D97-AF65-F5344CB8AC3E}">
-        <p14:creationId xmlns:p14="http://schemas.microsoft.com/office/powerpoint/2010/main" val="1034213985"/>
-      </p:ext>
-    </p:extLst>
   </p:cSld>
   <p:clrMapOvr>
     <a:masterClrMapping/>
@@ -19510,7 +19554,7 @@
       </p:grpSpPr>
       <p:sp>
         <p:nvSpPr>
-          <p:cNvPr id="16385" name="2 Título"/>
+          <p:cNvPr id="47105" name="2 Título"/>
           <p:cNvSpPr>
             <a:spLocks noGrp="1"/>
           </p:cNvSpPr>
@@ -19530,14 +19574,14 @@
           <a:p>
             <a:pPr eaLnBrk="1" hangingPunct="1"/>
             <a:r>
-              <a:rPr lang="en-US" b="1" dirty="0" smtClean="0">
+              <a:rPr lang="en-US" b="1" smtClean="0">
                 <a:solidFill>
                   <a:schemeClr val="tx2"/>
                 </a:solidFill>
               </a:rPr>
               <a:t>VISTA DE DESPLIEGUE</a:t>
             </a:r>
-            <a:endParaRPr lang="es-PE" b="1" dirty="0" smtClean="0">
+            <a:endParaRPr lang="es-PE" b="1" smtClean="0">
               <a:solidFill>
                 <a:schemeClr val="tx2"/>
               </a:solidFill>
@@ -19546,11 +19590,6 @@
         </p:txBody>
       </p:sp>
     </p:spTree>
-    <p:extLst>
-      <p:ext uri="{BB962C8B-B14F-4D97-AF65-F5344CB8AC3E}">
-        <p14:creationId xmlns:p14="http://schemas.microsoft.com/office/powerpoint/2010/main" val="2522526646"/>
-      </p:ext>
-    </p:extLst>
   </p:cSld>
   <p:clrMapOvr>
     <a:masterClrMapping/>
@@ -19584,7 +19623,7 @@
       </p:grpSpPr>
       <p:sp>
         <p:nvSpPr>
-          <p:cNvPr id="3" name="2 Título"/>
+          <p:cNvPr id="48129" name="2 Título"/>
           <p:cNvSpPr txBox="1">
             <a:spLocks/>
           </p:cNvSpPr>
@@ -19592,7 +19631,7 @@
         </p:nvSpPr>
         <p:spPr bwMode="auto">
           <a:xfrm>
-            <a:off x="454698" y="338138"/>
+            <a:off x="454025" y="338138"/>
             <a:ext cx="8229600" cy="1252537"/>
           </a:xfrm>
           <a:prstGeom prst="rect">
@@ -19607,9 +19646,7 @@
           </a:ln>
         </p:spPr>
         <p:txBody>
-          <a:bodyPr anchor="ctr">
-            <a:normAutofit/>
-          </a:bodyPr>
+          <a:bodyPr anchor="ctr"/>
           <a:lstStyle/>
           <a:p>
             <a:pPr algn="ctr">
@@ -19618,7 +19655,7 @@
               </a:lnSpc>
             </a:pPr>
             <a:r>
-              <a:rPr lang="en-US" sz="3200" b="1" dirty="0" smtClean="0">
+              <a:rPr lang="en-US" sz="3200" b="1">
                 <a:solidFill>
                   <a:srgbClr val="FFFFFF"/>
                 </a:solidFill>
@@ -19627,7 +19664,7 @@
               <a:t>Vista de </a:t>
             </a:r>
             <a:r>
-              <a:rPr lang="es-PE" sz="3200" b="1" dirty="0" smtClean="0">
+              <a:rPr lang="es-PE" sz="3200" b="1">
                 <a:solidFill>
                   <a:srgbClr val="FFFFFF"/>
                 </a:solidFill>
@@ -19635,31 +19672,19 @@
               </a:rPr>
               <a:t>despliegue</a:t>
             </a:r>
-            <a:endParaRPr lang="es-PE" sz="3200" b="1" dirty="0">
-              <a:solidFill>
-                <a:srgbClr val="FFFFFF"/>
-              </a:solidFill>
-              <a:latin typeface="Candara" pitchFamily="34" charset="0"/>
-            </a:endParaRPr>
           </a:p>
         </p:txBody>
       </p:sp>
       <p:pic>
         <p:nvPicPr>
-          <p:cNvPr id="9218" name="Picture 2" descr="https://lh3.googleusercontent.com/eA9UyNDDEqMOqfippXBPkykEF7ALSHnPk_-ZQN5Fq8Cil4G2B_tPZ2I6v5ebb5jUw0ZXMyFfN_2tNmGCLXJ_d7vX4Em3EdOftzKGy6TpCBc8r4eXbQ"/>
+          <p:cNvPr id="48130" name="Picture 2" descr="https://lh3.googleusercontent.com/eA9UyNDDEqMOqfippXBPkykEF7ALSHnPk_-ZQN5Fq8Cil4G2B_tPZ2I6v5ebb5jUw0ZXMyFfN_2tNmGCLXJ_d7vX4Em3EdOftzKGy6TpCBc8r4eXbQ"/>
           <p:cNvPicPr>
             <a:picLocks noChangeAspect="1" noChangeArrowheads="1"/>
           </p:cNvPicPr>
           <p:nvPr/>
         </p:nvPicPr>
         <p:blipFill>
-          <a:blip r:embed="rId3">
-            <a:extLst>
-              <a:ext uri="{28A0092B-C50C-407E-A947-70E740481C1C}">
-                <a14:useLocalDpi xmlns:a14="http://schemas.microsoft.com/office/drawing/2010/main" val="0"/>
-              </a:ext>
-            </a:extLst>
-          </a:blip>
+          <a:blip r:embed="rId3"/>
           <a:srcRect/>
           <a:stretch>
             <a:fillRect/>
@@ -19667,30 +19692,22 @@
         </p:blipFill>
         <p:spPr bwMode="auto">
           <a:xfrm>
-            <a:off x="1711998" y="2132856"/>
-            <a:ext cx="5715000" cy="4086226"/>
+            <a:off x="1711325" y="2133600"/>
+            <a:ext cx="5715000" cy="4086225"/>
           </a:xfrm>
           <a:prstGeom prst="rect">
             <a:avLst/>
           </a:prstGeom>
           <a:noFill/>
-          <a:extLst>
-            <a:ext uri="{909E8E84-426E-40DD-AFC4-6F175D3DCCD1}">
-              <a14:hiddenFill xmlns:a14="http://schemas.microsoft.com/office/drawing/2010/main">
-                <a:solidFill>
-                  <a:srgbClr val="FFFFFF"/>
-                </a:solidFill>
-              </a14:hiddenFill>
-            </a:ext>
-          </a:extLst>
+          <a:ln w="9525">
+            <a:noFill/>
+            <a:miter lim="800000"/>
+            <a:headEnd/>
+            <a:tailEnd/>
+          </a:ln>
         </p:spPr>
       </p:pic>
     </p:spTree>
-    <p:extLst>
-      <p:ext uri="{BB962C8B-B14F-4D97-AF65-F5344CB8AC3E}">
-        <p14:creationId xmlns:p14="http://schemas.microsoft.com/office/powerpoint/2010/main" val="633721573"/>
-      </p:ext>
-    </p:extLst>
   </p:cSld>
   <p:clrMapOvr>
     <a:masterClrMapping/>
@@ -19724,7 +19741,7 @@
       </p:grpSpPr>
       <p:sp>
         <p:nvSpPr>
-          <p:cNvPr id="16385" name="2 Título"/>
+          <p:cNvPr id="50177" name="2 Título"/>
           <p:cNvSpPr>
             <a:spLocks noGrp="1"/>
           </p:cNvSpPr>
@@ -19744,14 +19761,14 @@
           <a:p>
             <a:pPr eaLnBrk="1" hangingPunct="1"/>
             <a:r>
-              <a:rPr lang="en-US" b="1" dirty="0" smtClean="0">
+              <a:rPr lang="en-US" b="1" smtClean="0">
                 <a:solidFill>
                   <a:schemeClr val="tx2"/>
                 </a:solidFill>
               </a:rPr>
               <a:t>VISTA DE DATOS</a:t>
             </a:r>
-            <a:endParaRPr lang="es-PE" b="1" dirty="0" smtClean="0">
+            <a:endParaRPr lang="es-PE" b="1" smtClean="0">
               <a:solidFill>
                 <a:schemeClr val="tx2"/>
               </a:solidFill>
@@ -19760,11 +19777,6 @@
         </p:txBody>
       </p:sp>
     </p:spTree>
-    <p:extLst>
-      <p:ext uri="{BB962C8B-B14F-4D97-AF65-F5344CB8AC3E}">
-        <p14:creationId xmlns:p14="http://schemas.microsoft.com/office/powerpoint/2010/main" val="3446328164"/>
-      </p:ext>
-    </p:extLst>
   </p:cSld>
   <p:clrMapOvr>
     <a:masterClrMapping/>
@@ -19798,7 +19810,7 @@
       </p:grpSpPr>
       <p:sp>
         <p:nvSpPr>
-          <p:cNvPr id="3" name="2 Título"/>
+          <p:cNvPr id="51201" name="2 Título"/>
           <p:cNvSpPr txBox="1">
             <a:spLocks/>
           </p:cNvSpPr>
@@ -19806,8 +19818,8 @@
         </p:nvSpPr>
         <p:spPr bwMode="auto">
           <a:xfrm>
-            <a:off x="454698" y="338139"/>
-            <a:ext cx="8229600" cy="1002630"/>
+            <a:off x="454025" y="338138"/>
+            <a:ext cx="8229600" cy="1003300"/>
           </a:xfrm>
           <a:prstGeom prst="rect">
             <a:avLst/>
@@ -19821,9 +19833,7 @@
           </a:ln>
         </p:spPr>
         <p:txBody>
-          <a:bodyPr anchor="ctr">
-            <a:normAutofit/>
-          </a:bodyPr>
+          <a:bodyPr anchor="ctr"/>
           <a:lstStyle/>
           <a:p>
             <a:pPr algn="ctr">
@@ -19832,7 +19842,7 @@
               </a:lnSpc>
             </a:pPr>
             <a:r>
-              <a:rPr lang="en-US" sz="3200" b="1" dirty="0" smtClean="0">
+              <a:rPr lang="en-US" sz="3200" b="1">
                 <a:solidFill>
                   <a:srgbClr val="FFFFFF"/>
                 </a:solidFill>
@@ -19841,7 +19851,7 @@
               <a:t>Vista de </a:t>
             </a:r>
             <a:r>
-              <a:rPr lang="es-PE" sz="3200" b="1" dirty="0" smtClean="0">
+              <a:rPr lang="es-PE" sz="3200" b="1">
                 <a:solidFill>
                   <a:srgbClr val="FFFFFF"/>
                 </a:solidFill>
@@ -19849,51 +19859,43 @@
               </a:rPr>
               <a:t>datos</a:t>
             </a:r>
-            <a:endParaRPr lang="es-PE" sz="3200" b="1" dirty="0">
-              <a:solidFill>
-                <a:srgbClr val="FFFFFF"/>
-              </a:solidFill>
-              <a:latin typeface="Candara" pitchFamily="34" charset="0"/>
-            </a:endParaRPr>
           </a:p>
         </p:txBody>
       </p:sp>
       <p:pic>
         <p:nvPicPr>
-          <p:cNvPr id="2" name="1 Imagen"/>
+          <p:cNvPr id="51204" name="Picture 4"/>
           <p:cNvPicPr>
-            <a:picLocks noChangeAspect="1"/>
+            <a:picLocks noChangeAspect="1" noChangeArrowheads="1"/>
           </p:cNvPicPr>
           <p:nvPr/>
         </p:nvPicPr>
         <p:blipFill>
-          <a:blip r:embed="rId3">
-            <a:extLst>
-              <a:ext uri="{28A0092B-C50C-407E-A947-70E740481C1C}">
-                <a14:useLocalDpi xmlns:a14="http://schemas.microsoft.com/office/drawing/2010/main" val="0"/>
-              </a:ext>
-            </a:extLst>
-          </a:blip>
+          <a:blip r:embed="rId3"/>
+          <a:srcRect/>
           <a:stretch>
             <a:fillRect/>
           </a:stretch>
         </p:blipFill>
-        <p:spPr>
+        <p:spPr bwMode="auto">
           <a:xfrm>
-            <a:off x="315199" y="1460197"/>
-            <a:ext cx="8505273" cy="5137155"/>
+            <a:off x="1042988" y="1438275"/>
+            <a:ext cx="7121525" cy="5419725"/>
           </a:xfrm>
           <a:prstGeom prst="rect">
             <a:avLst/>
           </a:prstGeom>
+          <a:noFill/>
+          <a:ln w="9525">
+            <a:noFill/>
+            <a:miter lim="800000"/>
+            <a:headEnd/>
+            <a:tailEnd/>
+          </a:ln>
+          <a:effectLst/>
         </p:spPr>
       </p:pic>
     </p:spTree>
-    <p:extLst>
-      <p:ext uri="{BB962C8B-B14F-4D97-AF65-F5344CB8AC3E}">
-        <p14:creationId xmlns:p14="http://schemas.microsoft.com/office/powerpoint/2010/main" val="2978111386"/>
-      </p:ext>
-    </p:extLst>
   </p:cSld>
   <p:clrMapOvr>
     <a:masterClrMapping/>
@@ -19927,7 +19929,7 @@
       </p:grpSpPr>
       <p:sp>
         <p:nvSpPr>
-          <p:cNvPr id="31745" name="1 Título"/>
+          <p:cNvPr id="53249" name="1 Título"/>
           <p:cNvSpPr>
             <a:spLocks noGrp="1"/>
           </p:cNvSpPr>
@@ -19947,16 +19949,16 @@
           <a:p>
             <a:pPr eaLnBrk="1" hangingPunct="1"/>
             <a:r>
-              <a:rPr lang="es-PE" dirty="0" smtClean="0"/>
+              <a:rPr lang="es-PE" smtClean="0"/>
               <a:t>CONTRATOS DE CLIENTES</a:t>
             </a:r>
-            <a:endParaRPr lang="es-PE" sz="3600" dirty="0" smtClean="0"/>
+            <a:endParaRPr lang="es-PE" sz="3600" smtClean="0"/>
           </a:p>
         </p:txBody>
       </p:sp>
       <p:sp>
         <p:nvSpPr>
-          <p:cNvPr id="31746" name="3 CuadroTexto"/>
+          <p:cNvPr id="53250" name="3 CuadroTexto"/>
           <p:cNvSpPr txBox="1">
             <a:spLocks noChangeArrowheads="1"/>
           </p:cNvSpPr>
@@ -19986,28 +19988,16 @@
           <a:p>
             <a:pPr algn="r"/>
             <a:r>
-              <a:rPr lang="es-PE" sz="2400" dirty="0">
+              <a:rPr lang="es-PE" sz="2400">
                 <a:latin typeface="Candara" pitchFamily="34" charset="0"/>
               </a:rPr>
-              <a:t>Orlando </a:t>
-            </a:r>
-            <a:r>
-              <a:rPr lang="es-PE" sz="2400" dirty="0" err="1">
-                <a:latin typeface="Candara" pitchFamily="34" charset="0"/>
-              </a:rPr>
-              <a:t>Sedamano</a:t>
-            </a:r>
-            <a:r>
-              <a:rPr lang="es-PE" sz="2400" dirty="0">
-                <a:latin typeface="Candara" pitchFamily="34" charset="0"/>
-              </a:rPr>
-              <a:t> Cornejo</a:t>
+              <a:t>Orlando Sedamano Cornejo</a:t>
             </a:r>
           </a:p>
           <a:p>
             <a:pPr algn="r"/>
             <a:r>
-              <a:rPr lang="es-PE" sz="2400" dirty="0">
+              <a:rPr lang="es-PE" sz="2400">
                 <a:latin typeface="Candara" pitchFamily="34" charset="0"/>
               </a:rPr>
               <a:t>Marco Bustinza </a:t>
@@ -20016,7 +20006,7 @@
           <a:p>
             <a:pPr algn="r"/>
             <a:r>
-              <a:rPr lang="es-PE" sz="2400" dirty="0">
+              <a:rPr lang="es-PE" sz="2400">
                 <a:latin typeface="Candara" pitchFamily="34" charset="0"/>
               </a:rPr>
               <a:t>Néstor Robles Cacha</a:t>
@@ -20025,7 +20015,7 @@
           <a:p>
             <a:pPr algn="r"/>
             <a:r>
-              <a:rPr lang="es-PE" sz="2400" dirty="0">
+              <a:rPr lang="es-PE" sz="2400">
                 <a:latin typeface="Candara" pitchFamily="34" charset="0"/>
               </a:rPr>
               <a:t>Gabriela Rojas Munive </a:t>
@@ -20034,7 +20024,7 @@
           <a:p>
             <a:pPr algn="r"/>
             <a:r>
-              <a:rPr lang="es-PE" sz="2400" dirty="0">
+              <a:rPr lang="es-PE" sz="2400">
                 <a:latin typeface="Candara" pitchFamily="34" charset="0"/>
               </a:rPr>
               <a:t>Paola Rojas Chicoma</a:t>
@@ -20043,7 +20033,7 @@
           <a:p>
             <a:pPr algn="r"/>
             <a:r>
-              <a:rPr lang="es-PE" sz="2400" dirty="0">
+              <a:rPr lang="es-PE" sz="2400">
                 <a:latin typeface="Candara" pitchFamily="34" charset="0"/>
               </a:rPr>
               <a:t>Augusto Suárez Gutiérrez</a:t>
@@ -20051,7 +20041,7 @@
           </a:p>
           <a:p>
             <a:pPr algn="r"/>
-            <a:endParaRPr lang="es-PE" sz="2400" dirty="0">
+            <a:endParaRPr lang="es-PE" sz="2400">
               <a:solidFill>
                 <a:schemeClr val="bg1"/>
               </a:solidFill>
@@ -20062,7 +20052,7 @@
       </p:sp>
       <p:sp>
         <p:nvSpPr>
-          <p:cNvPr id="31747" name="4 CuadroTexto"/>
+          <p:cNvPr id="53251" name="4 CuadroTexto"/>
           <p:cNvSpPr txBox="1">
             <a:spLocks noChangeArrowheads="1"/>
           </p:cNvSpPr>
@@ -20091,7 +20081,7 @@
           <a:lstStyle/>
           <a:p>
             <a:r>
-              <a:rPr lang="es-PE" sz="5400" dirty="0">
+              <a:rPr lang="es-PE" sz="5400">
                 <a:solidFill>
                   <a:schemeClr val="bg1"/>
                 </a:solidFill>
@@ -20100,7 +20090,7 @@
               <a:t>GRACIAS </a:t>
             </a:r>
             <a:r>
-              <a:rPr lang="es-PE" sz="4800" dirty="0">
+              <a:rPr lang="es-PE" sz="4800">
                 <a:solidFill>
                   <a:schemeClr val="bg1"/>
                 </a:solidFill>
@@ -20112,11 +20102,6 @@
         </p:txBody>
       </p:sp>
     </p:spTree>
-    <p:extLst>
-      <p:ext uri="{BB962C8B-B14F-4D97-AF65-F5344CB8AC3E}">
-        <p14:creationId xmlns:p14="http://schemas.microsoft.com/office/powerpoint/2010/main" val="2665474422"/>
-      </p:ext>
-    </p:extLst>
   </p:cSld>
   <p:clrMapOvr>
     <a:masterClrMapping/>
@@ -20150,7 +20135,7 @@
       </p:grpSpPr>
       <p:sp>
         <p:nvSpPr>
-          <p:cNvPr id="16385" name="2 Título"/>
+          <p:cNvPr id="17409" name="2 Título"/>
           <p:cNvSpPr>
             <a:spLocks noGrp="1"/>
           </p:cNvSpPr>
@@ -20170,27 +20155,17 @@
           <a:p>
             <a:pPr eaLnBrk="1" hangingPunct="1"/>
             <a:r>
-              <a:rPr lang="es-PE" b="1" dirty="0" smtClean="0">
+              <a:rPr lang="es-PE" b="1" smtClean="0">
                 <a:solidFill>
                   <a:schemeClr val="tx2"/>
                 </a:solidFill>
               </a:rPr>
               <a:t>METAS Y RESTRICCIONES</a:t>
             </a:r>
-            <a:endParaRPr lang="es-PE" b="1" dirty="0" smtClean="0">
-              <a:solidFill>
-                <a:schemeClr val="tx2"/>
-              </a:solidFill>
-            </a:endParaRPr>
           </a:p>
         </p:txBody>
       </p:sp>
     </p:spTree>
-    <p:extLst>
-      <p:ext uri="{BB962C8B-B14F-4D97-AF65-F5344CB8AC3E}">
-        <p14:creationId xmlns:p14="http://schemas.microsoft.com/office/powerpoint/2010/main" val="3556683011"/>
-      </p:ext>
-    </p:extLst>
   </p:cSld>
   <p:clrMapOvr>
     <a:masterClrMapping/>
@@ -20224,7 +20199,7 @@
       </p:grpSpPr>
       <p:sp>
         <p:nvSpPr>
-          <p:cNvPr id="3" name="2 Título"/>
+          <p:cNvPr id="18433" name="2 Título"/>
           <p:cNvSpPr txBox="1">
             <a:spLocks/>
           </p:cNvSpPr>
@@ -20247,9 +20222,7 @@
           </a:ln>
         </p:spPr>
         <p:txBody>
-          <a:bodyPr anchor="ctr">
-            <a:normAutofit/>
-          </a:bodyPr>
+          <a:bodyPr anchor="ctr"/>
           <a:lstStyle/>
           <a:p>
             <a:pPr algn="ctr">
@@ -20258,7 +20231,7 @@
               </a:lnSpc>
             </a:pPr>
             <a:r>
-              <a:rPr lang="es-PE" sz="3200" b="1" dirty="0" smtClean="0">
+              <a:rPr lang="es-PE" sz="3200" b="1">
                 <a:solidFill>
                   <a:srgbClr val="FFFFFF"/>
                 </a:solidFill>
@@ -20266,12 +20239,6 @@
               </a:rPr>
               <a:t>Metas y restricciones</a:t>
             </a:r>
-            <a:endParaRPr lang="es-PE" sz="3200" b="1" dirty="0">
-              <a:solidFill>
-                <a:srgbClr val="FFFFFF"/>
-              </a:solidFill>
-              <a:latin typeface="Candara" pitchFamily="34" charset="0"/>
-            </a:endParaRPr>
           </a:p>
         </p:txBody>
       </p:sp>
@@ -20281,17 +20248,11 @@
           <p:cNvGraphicFramePr>
             <a:graphicFrameLocks noGrp="1"/>
           </p:cNvGraphicFramePr>
-          <p:nvPr>
-            <p:extLst>
-              <p:ext uri="{D42A27DB-BD31-4B8C-83A1-F6EECF244321}">
-                <p14:modId xmlns:p14="http://schemas.microsoft.com/office/powerpoint/2010/main" val="3715969536"/>
-              </p:ext>
-            </p:extLst>
-          </p:nvPr>
+          <p:nvPr/>
         </p:nvGraphicFramePr>
         <p:xfrm>
-          <a:off x="251172" y="2060848"/>
-          <a:ext cx="8641308" cy="4464496"/>
+          <a:off x="250825" y="2060575"/>
+          <a:ext cx="8642350" cy="4464050"/>
         </p:xfrm>
         <a:graphic>
           <a:graphicData uri="http://schemas.openxmlformats.org/drawingml/2006/table">
@@ -20777,7 +20738,7 @@
       </p:grpSpPr>
       <p:sp>
         <p:nvSpPr>
-          <p:cNvPr id="3" name="2 Título"/>
+          <p:cNvPr id="20481" name="2 Título"/>
           <p:cNvSpPr txBox="1">
             <a:spLocks/>
           </p:cNvSpPr>
@@ -20800,9 +20761,7 @@
           </a:ln>
         </p:spPr>
         <p:txBody>
-          <a:bodyPr anchor="ctr">
-            <a:normAutofit/>
-          </a:bodyPr>
+          <a:bodyPr anchor="ctr"/>
           <a:lstStyle/>
           <a:p>
             <a:pPr algn="ctr">
@@ -20811,7 +20770,7 @@
               </a:lnSpc>
             </a:pPr>
             <a:r>
-              <a:rPr lang="es-PE" sz="3200" b="1" dirty="0" smtClean="0">
+              <a:rPr lang="es-PE" sz="3200" b="1">
                 <a:solidFill>
                   <a:srgbClr val="FFFFFF"/>
                 </a:solidFill>
@@ -20819,12 +20778,6 @@
               </a:rPr>
               <a:t>Metas y restricciones</a:t>
             </a:r>
-            <a:endParaRPr lang="es-PE" sz="3200" b="1" dirty="0">
-              <a:solidFill>
-                <a:srgbClr val="FFFFFF"/>
-              </a:solidFill>
-              <a:latin typeface="Candara" pitchFamily="34" charset="0"/>
-            </a:endParaRPr>
           </a:p>
         </p:txBody>
       </p:sp>
@@ -20834,17 +20787,11 @@
           <p:cNvGraphicFramePr>
             <a:graphicFrameLocks noGrp="1"/>
           </p:cNvGraphicFramePr>
-          <p:nvPr>
-            <p:extLst>
-              <p:ext uri="{D42A27DB-BD31-4B8C-83A1-F6EECF244321}">
-                <p14:modId xmlns:p14="http://schemas.microsoft.com/office/powerpoint/2010/main" val="230178222"/>
-              </p:ext>
-            </p:extLst>
-          </p:nvPr>
+          <p:nvPr/>
         </p:nvGraphicFramePr>
         <p:xfrm>
-          <a:off x="251172" y="2060849"/>
-          <a:ext cx="8641308" cy="4596236"/>
+          <a:off x="250825" y="2060575"/>
+          <a:ext cx="8642350" cy="4595813"/>
         </p:xfrm>
         <a:graphic>
           <a:graphicData uri="http://schemas.openxmlformats.org/drawingml/2006/table">
@@ -21300,11 +21247,6 @@
         </a:graphic>
       </p:graphicFrame>
     </p:spTree>
-    <p:extLst>
-      <p:ext uri="{BB962C8B-B14F-4D97-AF65-F5344CB8AC3E}">
-        <p14:creationId xmlns:p14="http://schemas.microsoft.com/office/powerpoint/2010/main" val="2787669827"/>
-      </p:ext>
-    </p:extLst>
   </p:cSld>
   <p:clrMapOvr>
     <a:masterClrMapping/>
@@ -21338,7 +21280,7 @@
       </p:grpSpPr>
       <p:sp>
         <p:nvSpPr>
-          <p:cNvPr id="3" name="2 Título"/>
+          <p:cNvPr id="22529" name="2 Título"/>
           <p:cNvSpPr txBox="1">
             <a:spLocks/>
           </p:cNvSpPr>
@@ -21361,9 +21303,7 @@
           </a:ln>
         </p:spPr>
         <p:txBody>
-          <a:bodyPr anchor="ctr">
-            <a:normAutofit/>
-          </a:bodyPr>
+          <a:bodyPr anchor="ctr"/>
           <a:lstStyle/>
           <a:p>
             <a:pPr algn="ctr">
@@ -21372,7 +21312,7 @@
               </a:lnSpc>
             </a:pPr>
             <a:r>
-              <a:rPr lang="es-PE" sz="3200" b="1" dirty="0" smtClean="0">
+              <a:rPr lang="es-PE" sz="3200" b="1">
                 <a:solidFill>
                   <a:srgbClr val="FFFFFF"/>
                 </a:solidFill>
@@ -21380,12 +21320,6 @@
               </a:rPr>
               <a:t>Metas y restricciones</a:t>
             </a:r>
-            <a:endParaRPr lang="es-PE" sz="3200" b="1" dirty="0">
-              <a:solidFill>
-                <a:srgbClr val="FFFFFF"/>
-              </a:solidFill>
-              <a:latin typeface="Candara" pitchFamily="34" charset="0"/>
-            </a:endParaRPr>
           </a:p>
         </p:txBody>
       </p:sp>
@@ -21395,17 +21329,11 @@
           <p:cNvGraphicFramePr>
             <a:graphicFrameLocks noGrp="1"/>
           </p:cNvGraphicFramePr>
-          <p:nvPr>
-            <p:extLst>
-              <p:ext uri="{D42A27DB-BD31-4B8C-83A1-F6EECF244321}">
-                <p14:modId xmlns:p14="http://schemas.microsoft.com/office/powerpoint/2010/main" val="156396091"/>
-              </p:ext>
-            </p:extLst>
-          </p:nvPr>
+          <p:nvPr/>
         </p:nvGraphicFramePr>
         <p:xfrm>
-          <a:off x="251172" y="2060849"/>
-          <a:ext cx="8641308" cy="4383352"/>
+          <a:off x="250825" y="2060575"/>
+          <a:ext cx="8642350" cy="4383088"/>
         </p:xfrm>
         <a:graphic>
           <a:graphicData uri="http://schemas.openxmlformats.org/drawingml/2006/table">
@@ -21832,11 +21760,6 @@
         </a:graphic>
       </p:graphicFrame>
     </p:spTree>
-    <p:extLst>
-      <p:ext uri="{BB962C8B-B14F-4D97-AF65-F5344CB8AC3E}">
-        <p14:creationId xmlns:p14="http://schemas.microsoft.com/office/powerpoint/2010/main" val="2242433717"/>
-      </p:ext>
-    </p:extLst>
   </p:cSld>
   <p:clrMapOvr>
     <a:masterClrMapping/>
@@ -21870,7 +21793,7 @@
       </p:grpSpPr>
       <p:sp>
         <p:nvSpPr>
-          <p:cNvPr id="16385" name="2 Título"/>
+          <p:cNvPr id="24577" name="2 Título"/>
           <p:cNvSpPr>
             <a:spLocks noGrp="1"/>
           </p:cNvSpPr>
@@ -21890,14 +21813,14 @@
           <a:p>
             <a:pPr eaLnBrk="1" hangingPunct="1"/>
             <a:r>
-              <a:rPr lang="en-US" b="1" dirty="0" smtClean="0">
+              <a:rPr lang="en-US" b="1" smtClean="0">
                 <a:solidFill>
                   <a:schemeClr val="tx2"/>
                 </a:solidFill>
               </a:rPr>
               <a:t>VISTA DE CASOS DE USO</a:t>
             </a:r>
-            <a:endParaRPr lang="es-PE" b="1" dirty="0" smtClean="0">
+            <a:endParaRPr lang="es-PE" b="1" smtClean="0">
               <a:solidFill>
                 <a:schemeClr val="tx2"/>
               </a:solidFill>
@@ -21906,11 +21829,6 @@
         </p:txBody>
       </p:sp>
     </p:spTree>
-    <p:extLst>
-      <p:ext uri="{BB962C8B-B14F-4D97-AF65-F5344CB8AC3E}">
-        <p14:creationId xmlns:p14="http://schemas.microsoft.com/office/powerpoint/2010/main" val="3521085866"/>
-      </p:ext>
-    </p:extLst>
   </p:cSld>
   <p:clrMapOvr>
     <a:masterClrMapping/>
@@ -21944,20 +21862,14 @@
       </p:grpSpPr>
       <p:pic>
         <p:nvPicPr>
-          <p:cNvPr id="1026" name="Picture 2" descr="https://lh4.googleusercontent.com/Z7SGCkZxys1LwH53eguRHrxgrZbNUdQYeDdhQp3Ur1HuW27y0ehCBt0PS8y3r2-fhzqGFkXrNV_Xp3oHjhlYEGsJFgfpxqUP9dDzi5r4skaXh-n-oQ"/>
+          <p:cNvPr id="25601" name="Picture 2" descr="https://lh4.googleusercontent.com/Z7SGCkZxys1LwH53eguRHrxgrZbNUdQYeDdhQp3Ur1HuW27y0ehCBt0PS8y3r2-fhzqGFkXrNV_Xp3oHjhlYEGsJFgfpxqUP9dDzi5r4skaXh-n-oQ"/>
           <p:cNvPicPr>
             <a:picLocks noChangeAspect="1" noChangeArrowheads="1"/>
           </p:cNvPicPr>
           <p:nvPr/>
         </p:nvPicPr>
         <p:blipFill>
-          <a:blip r:embed="rId2">
-            <a:extLst>
-              <a:ext uri="{28A0092B-C50C-407E-A947-70E740481C1C}">
-                <a14:useLocalDpi xmlns:a14="http://schemas.microsoft.com/office/drawing/2010/main" val="0"/>
-              </a:ext>
-            </a:extLst>
-          </a:blip>
+          <a:blip r:embed="rId2"/>
           <a:srcRect/>
           <a:stretch>
             <a:fillRect/>
@@ -21965,27 +21877,24 @@
         </p:blipFill>
         <p:spPr bwMode="auto">
           <a:xfrm>
-            <a:off x="611560" y="1556792"/>
-            <a:ext cx="7981578" cy="4898187"/>
+            <a:off x="611188" y="1557338"/>
+            <a:ext cx="7981950" cy="4897437"/>
           </a:xfrm>
           <a:prstGeom prst="rect">
             <a:avLst/>
           </a:prstGeom>
           <a:noFill/>
-          <a:extLst>
-            <a:ext uri="{909E8E84-426E-40DD-AFC4-6F175D3DCCD1}">
-              <a14:hiddenFill xmlns:a14="http://schemas.microsoft.com/office/drawing/2010/main">
-                <a:solidFill>
-                  <a:srgbClr val="FFFFFF"/>
-                </a:solidFill>
-              </a14:hiddenFill>
-            </a:ext>
-          </a:extLst>
+          <a:ln w="9525">
+            <a:noFill/>
+            <a:miter lim="800000"/>
+            <a:headEnd/>
+            <a:tailEnd/>
+          </a:ln>
         </p:spPr>
       </p:pic>
       <p:sp>
         <p:nvSpPr>
-          <p:cNvPr id="4" name="2 Título"/>
+          <p:cNvPr id="25602" name="2 Título"/>
           <p:cNvSpPr txBox="1">
             <a:spLocks/>
           </p:cNvSpPr>
@@ -22008,9 +21917,7 @@
           </a:ln>
         </p:spPr>
         <p:txBody>
-          <a:bodyPr anchor="ctr">
-            <a:normAutofit/>
-          </a:bodyPr>
+          <a:bodyPr anchor="ctr"/>
           <a:lstStyle/>
           <a:p>
             <a:pPr algn="ctr">
@@ -22019,7 +21926,7 @@
               </a:lnSpc>
             </a:pPr>
             <a:r>
-              <a:rPr lang="es-PE" sz="3200" b="1" dirty="0" smtClean="0">
+              <a:rPr lang="es-PE" sz="3200" b="1">
                 <a:solidFill>
                   <a:srgbClr val="FFFFFF"/>
                 </a:solidFill>
@@ -22027,21 +21934,10 @@
               </a:rPr>
               <a:t>Vista de casos de uso</a:t>
             </a:r>
-            <a:endParaRPr lang="es-PE" sz="3200" b="1" dirty="0">
-              <a:solidFill>
-                <a:srgbClr val="FFFFFF"/>
-              </a:solidFill>
-              <a:latin typeface="Candara" pitchFamily="34" charset="0"/>
-            </a:endParaRPr>
           </a:p>
         </p:txBody>
       </p:sp>
     </p:spTree>
-    <p:extLst>
-      <p:ext uri="{BB962C8B-B14F-4D97-AF65-F5344CB8AC3E}">
-        <p14:creationId xmlns:p14="http://schemas.microsoft.com/office/powerpoint/2010/main" val="261500499"/>
-      </p:ext>
-    </p:extLst>
   </p:cSld>
   <p:clrMapOvr>
     <a:masterClrMapping/>
@@ -22075,7 +21971,7 @@
       </p:grpSpPr>
       <p:sp>
         <p:nvSpPr>
-          <p:cNvPr id="16385" name="2 Título"/>
+          <p:cNvPr id="26625" name="2 Título"/>
           <p:cNvSpPr>
             <a:spLocks noGrp="1"/>
           </p:cNvSpPr>
@@ -22095,14 +21991,14 @@
           <a:p>
             <a:pPr eaLnBrk="1" hangingPunct="1"/>
             <a:r>
-              <a:rPr lang="en-US" b="1" dirty="0" smtClean="0">
+              <a:rPr lang="en-US" b="1" smtClean="0">
                 <a:solidFill>
                   <a:schemeClr val="tx2"/>
                 </a:solidFill>
               </a:rPr>
               <a:t>MECANISMOS</a:t>
             </a:r>
-            <a:endParaRPr lang="es-PE" b="1" dirty="0" smtClean="0">
+            <a:endParaRPr lang="es-PE" b="1" smtClean="0">
               <a:solidFill>
                 <a:schemeClr val="tx2"/>
               </a:solidFill>
@@ -22111,11 +22007,6 @@
         </p:txBody>
       </p:sp>
     </p:spTree>
-    <p:extLst>
-      <p:ext uri="{BB962C8B-B14F-4D97-AF65-F5344CB8AC3E}">
-        <p14:creationId xmlns:p14="http://schemas.microsoft.com/office/powerpoint/2010/main" val="2401632637"/>
-      </p:ext>
-    </p:extLst>
   </p:cSld>
   <p:clrMapOvr>
     <a:masterClrMapping/>

</xml_diff>

<commit_message>
SE ACTUALIZARON VISTAS DE IMPLEMENTACION
</commit_message>
<xml_diff>
--- a/ITERACION 4/SUB ITERACION 1/PPT I4S1 v1.pptx
+++ b/ITERACION 4/SUB ITERACION 1/PPT I4S1 v1.pptx
@@ -266,7 +266,7 @@
             <a:pPr>
               <a:defRPr/>
             </a:pPr>
-            <a:fld id="{6E53C902-A770-4766-9030-11F8DBDC6F7F}" type="datetimeFigureOut">
+            <a:fld id="{BCB18C15-E3DC-4C08-B8F2-11DC3F769C33}" type="datetimeFigureOut">
               <a:rPr lang="es-PE"/>
               <a:pPr>
                 <a:defRPr/>
@@ -453,7 +453,7 @@
             <a:pPr>
               <a:defRPr/>
             </a:pPr>
-            <a:fld id="{8FF62E9C-D502-4F38-9321-254E83EC52FE}" type="slidenum">
+            <a:fld id="{36DA44B5-FE1D-4C35-9D56-C0583BCD8ED3}" type="slidenum">
               <a:rPr lang="es-PE"/>
               <a:pPr>
                 <a:defRPr/>
@@ -674,7 +674,7 @@
             <a:pPr>
               <a:defRPr/>
             </a:pPr>
-            <a:fld id="{59C215EB-6145-427D-81A9-0FBFF7813EE4}" type="slidenum">
+            <a:fld id="{3661E481-BA2D-4422-9AC6-59A855E9731F}" type="slidenum">
               <a:rPr lang="es-PE" smtClean="0"/>
               <a:pPr>
                 <a:defRPr/>
@@ -775,7 +775,7 @@
             <a:pPr>
               <a:defRPr/>
             </a:pPr>
-            <a:fld id="{FBCFE57E-7CD8-46E4-BC2D-5BD82A186E6D}" type="slidenum">
+            <a:fld id="{FB2BF196-D2DC-4218-95BC-020FCC407207}" type="slidenum">
               <a:rPr lang="es-PE" smtClean="0"/>
               <a:pPr>
                 <a:defRPr/>
@@ -876,7 +876,7 @@
             <a:pPr>
               <a:defRPr/>
             </a:pPr>
-            <a:fld id="{AB14AF44-AFC7-458C-AB67-333CD9E4C1A0}" type="slidenum">
+            <a:fld id="{AE974D2F-4393-4A02-8B41-EFFBEDBC0B7E}" type="slidenum">
               <a:rPr lang="es-PE" smtClean="0"/>
               <a:pPr>
                 <a:defRPr/>
@@ -977,7 +977,7 @@
             <a:pPr>
               <a:defRPr/>
             </a:pPr>
-            <a:fld id="{2ACBA147-A8C1-4BAE-BCFD-E8B7FAB602F1}" type="slidenum">
+            <a:fld id="{99BE85C4-EF31-4030-9861-173FD1FAB986}" type="slidenum">
               <a:rPr lang="es-PE" smtClean="0"/>
               <a:pPr>
                 <a:defRPr/>
@@ -1078,7 +1078,7 @@
             <a:pPr>
               <a:defRPr/>
             </a:pPr>
-            <a:fld id="{E3F2CF91-BB2B-4612-BADF-539F4C7C8244}" type="slidenum">
+            <a:fld id="{F187C4D7-30B9-4FD6-9EEE-18FE14D58960}" type="slidenum">
               <a:rPr lang="es-PE" smtClean="0"/>
               <a:pPr>
                 <a:defRPr/>
@@ -1179,7 +1179,7 @@
             <a:pPr>
               <a:defRPr/>
             </a:pPr>
-            <a:fld id="{1BDD0FC9-930E-4A1D-8E52-4721472E38DD}" type="slidenum">
+            <a:fld id="{4182DF63-2F92-4A86-AB7E-C508160956C0}" type="slidenum">
               <a:rPr lang="es-PE" smtClean="0"/>
               <a:pPr>
                 <a:defRPr/>
@@ -1280,7 +1280,7 @@
             <a:pPr>
               <a:defRPr/>
             </a:pPr>
-            <a:fld id="{6C20F540-397D-4B60-A34F-BBA456D3AC68}" type="slidenum">
+            <a:fld id="{B63636F5-C782-40FE-87C7-9CAA2BD8FEA6}" type="slidenum">
               <a:rPr lang="es-PE" smtClean="0"/>
               <a:pPr>
                 <a:defRPr/>
@@ -1381,7 +1381,7 @@
             <a:pPr>
               <a:defRPr/>
             </a:pPr>
-            <a:fld id="{E3BEAF12-CD83-4FE9-9C71-524F02E95379}" type="slidenum">
+            <a:fld id="{FB970E4E-D80B-4671-9096-A83638DA02A8}" type="slidenum">
               <a:rPr lang="es-PE" smtClean="0"/>
               <a:pPr>
                 <a:defRPr/>
@@ -1482,7 +1482,7 @@
             <a:pPr>
               <a:defRPr/>
             </a:pPr>
-            <a:fld id="{8F77ACAA-0C16-4114-BCE1-F722174438C4}" type="slidenum">
+            <a:fld id="{BA50977D-A45A-4DEE-90BA-9CE087633837}" type="slidenum">
               <a:rPr lang="es-PE" smtClean="0"/>
               <a:pPr>
                 <a:defRPr/>
@@ -1583,7 +1583,7 @@
             <a:pPr>
               <a:defRPr/>
             </a:pPr>
-            <a:fld id="{1EF3A7CB-3F6A-4022-8766-64C7AF4575D5}" type="slidenum">
+            <a:fld id="{21C6CEF1-C4A2-4C7B-88E9-D0285EE6299F}" type="slidenum">
               <a:rPr lang="es-PE" smtClean="0"/>
               <a:pPr>
                 <a:defRPr/>
@@ -1684,7 +1684,7 @@
             <a:pPr>
               <a:defRPr/>
             </a:pPr>
-            <a:fld id="{C64541C2-98D2-478D-8D99-BA1ADE45A86B}" type="slidenum">
+            <a:fld id="{F05FDCA1-5EFF-4531-98BA-19FF11E2818F}" type="slidenum">
               <a:rPr lang="es-PE" smtClean="0"/>
               <a:pPr>
                 <a:defRPr/>
@@ -1785,7 +1785,7 @@
             <a:pPr>
               <a:defRPr/>
             </a:pPr>
-            <a:fld id="{B45EBC4D-B715-455F-AD7F-ABDAA3C53A77}" type="slidenum">
+            <a:fld id="{D3006D18-8906-4E79-970D-401B1D3D2F53}" type="slidenum">
               <a:rPr lang="es-PE" smtClean="0"/>
               <a:pPr>
                 <a:defRPr/>
@@ -1886,7 +1886,7 @@
             <a:pPr>
               <a:defRPr/>
             </a:pPr>
-            <a:fld id="{2C43339C-AA73-4483-9CCD-C0990F6A5C40}" type="slidenum">
+            <a:fld id="{1705721D-0802-41DD-B0F4-D9B0C91AD093}" type="slidenum">
               <a:rPr lang="es-PE" smtClean="0"/>
               <a:pPr>
                 <a:defRPr/>
@@ -3765,7 +3765,7 @@
             <a:pPr>
               <a:defRPr/>
             </a:pPr>
-            <a:fld id="{6B35BDC8-FD13-4BF7-855C-B6E1A3CC3B35}" type="datetimeFigureOut">
+            <a:fld id="{A4670202-9172-4260-8EAC-F10437F8EE10}" type="datetimeFigureOut">
               <a:rPr lang="es-PE"/>
               <a:pPr>
                 <a:defRPr/>
@@ -3824,7 +3824,7 @@
             <a:pPr>
               <a:defRPr/>
             </a:pPr>
-            <a:fld id="{5C3F56AB-ACB1-4480-A2C0-3007FD278A81}" type="slidenum">
+            <a:fld id="{6A30008E-BAA6-4A6F-8974-40F08C34B3D0}" type="slidenum">
               <a:rPr lang="es-PE"/>
               <a:pPr>
                 <a:defRPr/>
@@ -3973,7 +3973,7 @@
             <a:pPr>
               <a:defRPr/>
             </a:pPr>
-            <a:fld id="{7B297C8B-1F26-4B24-A665-FDC29B577567}" type="datetimeFigureOut">
+            <a:fld id="{D301F590-5F8C-4347-9676-105286B33E3F}" type="datetimeFigureOut">
               <a:rPr lang="es-PE"/>
               <a:pPr>
                 <a:defRPr/>
@@ -4032,7 +4032,7 @@
             <a:pPr>
               <a:defRPr/>
             </a:pPr>
-            <a:fld id="{43D37F2B-721C-41B5-9792-B404C2CE5BFD}" type="slidenum">
+            <a:fld id="{2C58598D-03AB-4989-9850-5C9712E57F46}" type="slidenum">
               <a:rPr lang="es-PE"/>
               <a:pPr>
                 <a:defRPr/>
@@ -5878,7 +5878,7 @@
             <a:pPr>
               <a:defRPr/>
             </a:pPr>
-            <a:fld id="{0B962058-1191-4D20-AF6B-CEC9DE8B54F9}" type="datetimeFigureOut">
+            <a:fld id="{4AE2907F-6A46-439F-BAEC-052EDFD84144}" type="datetimeFigureOut">
               <a:rPr lang="es-PE"/>
               <a:pPr>
                 <a:defRPr/>
@@ -5937,7 +5937,7 @@
             <a:pPr>
               <a:defRPr/>
             </a:pPr>
-            <a:fld id="{F45111E4-C9EC-4A28-A668-9D3467150C9A}" type="slidenum">
+            <a:fld id="{5904DBA7-8BAF-4CD3-8108-D06B7D2D0F15}" type="slidenum">
               <a:rPr lang="es-PE"/>
               <a:pPr>
                 <a:defRPr/>
@@ -5995,7 +5995,7 @@
             <a:pPr>
               <a:defRPr/>
             </a:pPr>
-            <a:fld id="{51C1DF64-E3F4-4714-B0A8-84E9F7A16429}" type="datetimeFigureOut">
+            <a:fld id="{48CDCF8A-488F-4C00-89D2-C72CE7F77053}" type="datetimeFigureOut">
               <a:rPr lang="es-PE"/>
               <a:pPr>
                 <a:defRPr/>
@@ -6054,7 +6054,7 @@
             <a:pPr>
               <a:defRPr/>
             </a:pPr>
-            <a:fld id="{967E2763-7A51-4198-982B-9C959D62034B}" type="slidenum">
+            <a:fld id="{54B1A006-1CD5-46CD-8B9C-A9A886CB05D7}" type="slidenum">
               <a:rPr lang="es-PE"/>
               <a:pPr>
                 <a:defRPr/>
@@ -6187,7 +6187,7 @@
             <a:pPr>
               <a:defRPr/>
             </a:pPr>
-            <a:fld id="{02D376A9-DE34-4683-98BF-BF591A9C86B2}" type="datetimeFigureOut">
+            <a:fld id="{CCD6E400-505F-44BF-B611-60747A9539C7}" type="datetimeFigureOut">
               <a:rPr lang="es-PE"/>
               <a:pPr>
                 <a:defRPr/>
@@ -6246,7 +6246,7 @@
             <a:pPr>
               <a:defRPr/>
             </a:pPr>
-            <a:fld id="{934ECF9E-9C27-4FFD-B1D4-40B55CC9FC0B}" type="slidenum">
+            <a:fld id="{B2A5E779-C2B6-4EBB-A44C-36157727304F}" type="slidenum">
               <a:rPr lang="es-PE"/>
               <a:pPr>
                 <a:defRPr/>
@@ -8104,7 +8104,7 @@
             <a:pPr>
               <a:defRPr/>
             </a:pPr>
-            <a:fld id="{D5AB0344-AB75-4563-B7C6-99D969023392}" type="datetimeFigureOut">
+            <a:fld id="{5DF50329-B5D9-48B0-813B-E378B249EAFC}" type="datetimeFigureOut">
               <a:rPr lang="es-PE"/>
               <a:pPr>
                 <a:defRPr/>
@@ -8163,7 +8163,7 @@
             <a:pPr>
               <a:defRPr/>
             </a:pPr>
-            <a:fld id="{989ADE72-7F4D-4E09-8788-962EA4206721}" type="slidenum">
+            <a:fld id="{57310D1B-893D-4694-BC19-58961C15879F}" type="slidenum">
               <a:rPr lang="es-PE"/>
               <a:pPr>
                 <a:defRPr/>
@@ -8358,7 +8358,7 @@
             <a:pPr>
               <a:defRPr/>
             </a:pPr>
-            <a:fld id="{2AAD47DA-B742-448A-8396-6131F2574B59}" type="datetimeFigureOut">
+            <a:fld id="{134FD007-3D28-44D8-A906-C008C8E61F8E}" type="datetimeFigureOut">
               <a:rPr lang="es-PE"/>
               <a:pPr>
                 <a:defRPr/>
@@ -8417,7 +8417,7 @@
             <a:pPr>
               <a:defRPr/>
             </a:pPr>
-            <a:fld id="{2461820B-ED5C-4100-8A1A-8E7640EA997E}" type="slidenum">
+            <a:fld id="{0DC58E51-4FC0-4F37-AE22-AA81186F5A13}" type="slidenum">
               <a:rPr lang="es-PE"/>
               <a:pPr>
                 <a:defRPr/>
@@ -8812,7 +8812,7 @@
             <a:pPr>
               <a:defRPr/>
             </a:pPr>
-            <a:fld id="{70D37C80-70E1-4BE4-8078-72183760BBF9}" type="datetimeFigureOut">
+            <a:fld id="{48E13048-4E31-43BB-A064-5B9B28552FFE}" type="datetimeFigureOut">
               <a:rPr lang="es-PE"/>
               <a:pPr>
                 <a:defRPr/>
@@ -8871,7 +8871,7 @@
             <a:pPr>
               <a:defRPr/>
             </a:pPr>
-            <a:fld id="{372BA01D-2481-4C8D-802A-E8ABF31A13E6}" type="slidenum">
+            <a:fld id="{C019EDF7-FBE0-4D3D-918C-8D7C99035A81}" type="slidenum">
               <a:rPr lang="es-PE"/>
               <a:pPr>
                 <a:defRPr/>
@@ -8952,7 +8952,7 @@
             <a:pPr>
               <a:defRPr/>
             </a:pPr>
-            <a:fld id="{35A2D6C9-C8AD-419A-903B-0F3307195841}" type="datetimeFigureOut">
+            <a:fld id="{29D0E944-1DDE-42CA-892F-03BAA0133918}" type="datetimeFigureOut">
               <a:rPr lang="es-PE"/>
               <a:pPr>
                 <a:defRPr/>
@@ -9011,7 +9011,7 @@
             <a:pPr>
               <a:defRPr/>
             </a:pPr>
-            <a:fld id="{00343336-5AB5-4005-88C5-87B6C444FA19}" type="slidenum">
+            <a:fld id="{978E8CBA-2E52-42DD-BEDC-FA6B15194EED}" type="slidenum">
               <a:rPr lang="es-PE"/>
               <a:pPr>
                 <a:defRPr/>
@@ -10733,7 +10733,7 @@
             <a:pPr>
               <a:defRPr/>
             </a:pPr>
-            <a:fld id="{380F2D21-BCA7-4159-9A3E-15C2E055F9B7}" type="datetimeFigureOut">
+            <a:fld id="{A714838D-070D-4125-B42D-114A66FC0701}" type="datetimeFigureOut">
               <a:rPr lang="es-PE"/>
               <a:pPr>
                 <a:defRPr/>
@@ -10792,7 +10792,7 @@
             <a:pPr>
               <a:defRPr/>
             </a:pPr>
-            <a:fld id="{FBD16669-542B-44D2-848D-A33DFB1E645F}" type="slidenum">
+            <a:fld id="{46D0F39C-9B7A-4DEA-8E46-455654F39DAF}" type="slidenum">
               <a:rPr lang="es-PE"/>
               <a:pPr>
                 <a:defRPr/>
@@ -12749,7 +12749,7 @@
             <a:pPr>
               <a:defRPr/>
             </a:pPr>
-            <a:fld id="{5B483571-7C11-4103-8A47-1D9E865D3959}" type="datetimeFigureOut">
+            <a:fld id="{B84631C7-0C9B-4A86-859B-0CCA9A7353AE}" type="datetimeFigureOut">
               <a:rPr lang="es-PE"/>
               <a:pPr>
                 <a:defRPr/>
@@ -12808,7 +12808,7 @@
             <a:pPr>
               <a:defRPr/>
             </a:pPr>
-            <a:fld id="{53459EA2-2F01-4B01-BA78-64090B4531FE}" type="slidenum">
+            <a:fld id="{C3118B3C-5878-4045-A1DA-65A340973960}" type="slidenum">
               <a:rPr lang="es-PE"/>
               <a:pPr>
                 <a:defRPr/>
@@ -14736,7 +14736,7 @@
             <a:pPr>
               <a:defRPr/>
             </a:pPr>
-            <a:fld id="{BC78C620-BF58-4D00-B4C2-4810A427B2E1}" type="datetimeFigureOut">
+            <a:fld id="{415DE9E8-56B5-4B1F-8A30-C5DF7D2F686C}" type="datetimeFigureOut">
               <a:rPr lang="es-PE"/>
               <a:pPr>
                 <a:defRPr/>
@@ -14795,7 +14795,7 @@
             <a:pPr>
               <a:defRPr/>
             </a:pPr>
-            <a:fld id="{E0984922-23AD-41F4-95D9-CC4519B45D39}" type="slidenum">
+            <a:fld id="{A9EA809B-58F2-46B1-A7D0-83E1610C8D3B}" type="slidenum">
               <a:rPr lang="es-PE"/>
               <a:pPr>
                 <a:defRPr/>
@@ -16584,7 +16584,7 @@
             <a:pPr>
               <a:defRPr/>
             </a:pPr>
-            <a:fld id="{442B46A8-163C-4E83-B0FE-35B7CA09250F}" type="datetimeFigureOut">
+            <a:fld id="{B9BA4EB1-779C-4974-8195-EE30A308FF1B}" type="datetimeFigureOut">
               <a:rPr lang="es-PE"/>
               <a:pPr>
                 <a:defRPr/>
@@ -16681,7 +16681,7 @@
             <a:pPr>
               <a:defRPr/>
             </a:pPr>
-            <a:fld id="{F38B95F5-B22B-486A-93B8-95D7CA890411}" type="slidenum">
+            <a:fld id="{DAC750DF-5C3F-4436-82EC-05052D04C4C0}" type="slidenum">
               <a:rPr lang="es-PE"/>
               <a:pPr>
                 <a:defRPr/>
@@ -16768,17 +16768,17 @@
   <p:clrMap bg1="lt1" tx1="dk1" bg2="lt2" tx2="dk2" accent1="accent1" accent2="accent2" accent3="accent3" accent4="accent4" accent5="accent5" accent6="accent6" hlink="hlink" folHlink="folHlink"/>
   <p:sldLayoutIdLst>
     <p:sldLayoutId id="2147483673" r:id="rId1"/>
-    <p:sldLayoutId id="2147483672" r:id="rId2"/>
+    <p:sldLayoutId id="2147483667" r:id="rId2"/>
     <p:sldLayoutId id="2147483674" r:id="rId3"/>
-    <p:sldLayoutId id="2147483671" r:id="rId4"/>
-    <p:sldLayoutId id="2147483670" r:id="rId5"/>
-    <p:sldLayoutId id="2147483669" r:id="rId6"/>
+    <p:sldLayoutId id="2147483668" r:id="rId4"/>
+    <p:sldLayoutId id="2147483669" r:id="rId5"/>
+    <p:sldLayoutId id="2147483670" r:id="rId6"/>
     <p:sldLayoutId id="2147483675" r:id="rId7"/>
     <p:sldLayoutId id="2147483676" r:id="rId8"/>
     <p:sldLayoutId id="2147483677" r:id="rId9"/>
-    <p:sldLayoutId id="2147483668" r:id="rId10"/>
+    <p:sldLayoutId id="2147483671" r:id="rId10"/>
     <p:sldLayoutId id="2147483678" r:id="rId11"/>
-    <p:sldLayoutId id="2147483667" r:id="rId12"/>
+    <p:sldLayoutId id="2147483672" r:id="rId12"/>
   </p:sldLayoutIdLst>
   <p:txStyles>
     <p:titleStyle>
@@ -17476,13 +17476,7 @@
               <a:rPr lang="es-PE" sz="1600" dirty="0">
                 <a:latin typeface="+mn-lt"/>
               </a:rPr>
-              <a:t> </a:t>
-            </a:r>
-            <a:r>
-              <a:rPr lang="es-PE" sz="1600" dirty="0">
-                <a:latin typeface="+mn-lt"/>
-              </a:rPr>
-              <a:t>es un </a:t>
+              <a:t> es un </a:t>
             </a:r>
             <a:r>
               <a:rPr lang="es-PE" sz="1600" dirty="0" err="1">
@@ -17532,9 +17526,6 @@
               </a:rPr>
               <a:t>). </a:t>
             </a:r>
-            <a:endParaRPr lang="es-PE" sz="1600" dirty="0">
-              <a:latin typeface="+mn-lt"/>
-            </a:endParaRPr>
           </a:p>
           <a:p>
             <a:pPr algn="just">
@@ -17552,23 +17543,8 @@
               <a:rPr lang="es-PE" sz="1600" dirty="0">
                 <a:latin typeface="+mn-lt"/>
               </a:rPr>
-              <a:t>Un </a:t>
+              <a:t>Un ORM permite abstraer el acceso a una base de datos relacional en una capa que resuelva el acceso a datos.</a:t>
             </a:r>
-            <a:r>
-              <a:rPr lang="es-PE" sz="1600" dirty="0">
-                <a:latin typeface="+mn-lt"/>
-              </a:rPr>
-              <a:t>ORM permite abstraer el acceso a una base de datos relacional en una capa que resuelva el acceso a </a:t>
-            </a:r>
-            <a:r>
-              <a:rPr lang="es-PE" sz="1600" dirty="0">
-                <a:latin typeface="+mn-lt"/>
-              </a:rPr>
-              <a:t>datos.</a:t>
-            </a:r>
-            <a:endParaRPr lang="es-PE" sz="1600" dirty="0">
-              <a:latin typeface="+mn-lt"/>
-            </a:endParaRPr>
           </a:p>
         </p:txBody>
       </p:sp>
@@ -17696,13 +17672,7 @@
               <a:rPr lang="es-PE" sz="1600" b="1" dirty="0">
                 <a:latin typeface="+mn-lt"/>
               </a:rPr>
-              <a:t> para </a:t>
-            </a:r>
-            <a:r>
-              <a:rPr lang="es-PE" sz="1600" b="1" dirty="0">
-                <a:latin typeface="+mn-lt"/>
-              </a:rPr>
-              <a:t>ASP.net</a:t>
+              <a:t> para ASP.net</a:t>
             </a:r>
           </a:p>
           <a:p>
@@ -17721,23 +17691,8 @@
               <a:rPr lang="es-PE" sz="1600" dirty="0">
                 <a:latin typeface="+mn-lt"/>
               </a:rPr>
-              <a:t>Es </a:t>
+              <a:t>Es una herramienta de creación de informes que tiene la habilidad de entregar contenido enriquecido al monitor, a la impresora o a ficheros PDF, HTML, XLS, CSV y XML.</a:t>
             </a:r>
-            <a:r>
-              <a:rPr lang="es-PE" sz="1600" dirty="0">
-                <a:latin typeface="+mn-lt"/>
-              </a:rPr>
-              <a:t>una herramienta de creación de informes que tiene la habilidad de entregar contenido enriquecido al monitor, a la impresora o a ficheros PDF, HTML, XLS, CSV y XML</a:t>
-            </a:r>
-            <a:r>
-              <a:rPr lang="es-PE" sz="1600" dirty="0">
-                <a:latin typeface="+mn-lt"/>
-              </a:rPr>
-              <a:t>.</a:t>
-            </a:r>
-            <a:endParaRPr lang="es-PE" sz="1600" dirty="0">
-              <a:latin typeface="+mn-lt"/>
-            </a:endParaRPr>
           </a:p>
         </p:txBody>
       </p:sp>
@@ -17879,13 +17834,7 @@
               <a:rPr lang="es-PE" sz="1600" dirty="0">
                 <a:latin typeface="+mn-lt"/>
               </a:rPr>
-              <a:t>Se </a:t>
-            </a:r>
-            <a:r>
-              <a:rPr lang="es-PE" sz="1600" dirty="0">
-                <a:latin typeface="+mn-lt"/>
-              </a:rPr>
-              <a:t>utilizará el archivo </a:t>
+              <a:t>Se utilizará el archivo </a:t>
             </a:r>
             <a:r>
               <a:rPr lang="es-PE" sz="1600" b="1" dirty="0" err="1">
@@ -18412,23 +18361,8 @@
               <a:rPr lang="es-PE" sz="1600" dirty="0">
                 <a:latin typeface="+mn-lt"/>
               </a:rPr>
-              <a:t>Mostrar </a:t>
+              <a:t>Mostrar tablero de mando.</a:t>
             </a:r>
-            <a:r>
-              <a:rPr lang="es-PE" sz="1600" dirty="0">
-                <a:latin typeface="+mn-lt"/>
-              </a:rPr>
-              <a:t>tablero de </a:t>
-            </a:r>
-            <a:r>
-              <a:rPr lang="es-PE" sz="1600" dirty="0">
-                <a:latin typeface="+mn-lt"/>
-              </a:rPr>
-              <a:t>mando.</a:t>
-            </a:r>
-            <a:endParaRPr lang="es-PE" sz="1600" dirty="0">
-              <a:latin typeface="+mn-lt"/>
-            </a:endParaRPr>
           </a:p>
           <a:p>
             <a:pPr marL="285750" indent="-285750" algn="just">
@@ -18443,17 +18377,8 @@
               <a:rPr lang="es-PE" sz="1600" dirty="0">
                 <a:latin typeface="+mn-lt"/>
               </a:rPr>
-              <a:t>Mostrar </a:t>
+              <a:t>Mostrar reportes.</a:t>
             </a:r>
-            <a:r>
-              <a:rPr lang="es-PE" sz="1600" dirty="0">
-                <a:latin typeface="+mn-lt"/>
-              </a:rPr>
-              <a:t>reportes.</a:t>
-            </a:r>
-            <a:endParaRPr lang="es-PE" sz="1600" dirty="0">
-              <a:latin typeface="+mn-lt"/>
-            </a:endParaRPr>
           </a:p>
           <a:p>
             <a:pPr marL="285750" indent="-285750" algn="just">
@@ -18482,9 +18407,6 @@
               </a:rPr>
               <a:t>.</a:t>
             </a:r>
-            <a:endParaRPr lang="es-PE" sz="1600" dirty="0">
-              <a:latin typeface="+mn-lt"/>
-            </a:endParaRPr>
           </a:p>
           <a:p>
             <a:pPr marL="285750" indent="-285750" algn="just">
@@ -18527,17 +18449,8 @@
               <a:rPr lang="es-PE" sz="1600" dirty="0">
                 <a:latin typeface="+mn-lt"/>
               </a:rPr>
-              <a:t>Usar hora de </a:t>
+              <a:t>Usar hora de estilos.</a:t>
             </a:r>
-            <a:r>
-              <a:rPr lang="es-PE" sz="1600" dirty="0">
-                <a:latin typeface="+mn-lt"/>
-              </a:rPr>
-              <a:t>estilos.</a:t>
-            </a:r>
-            <a:endParaRPr lang="es-PE" sz="1600" dirty="0">
-              <a:latin typeface="+mn-lt"/>
-            </a:endParaRPr>
           </a:p>
           <a:p>
             <a:pPr marL="285750" indent="-285750" algn="just">
@@ -18552,17 +18465,8 @@
               <a:rPr lang="es-PE" sz="1600" dirty="0">
                 <a:latin typeface="+mn-lt"/>
               </a:rPr>
-              <a:t>Validaciones de datos en formularios, validación de datos </a:t>
+              <a:t>Validaciones de datos en formularios, validación de datos obligatorios.</a:t>
             </a:r>
-            <a:r>
-              <a:rPr lang="es-PE" sz="1600" dirty="0">
-                <a:latin typeface="+mn-lt"/>
-              </a:rPr>
-              <a:t>obligatorios.</a:t>
-            </a:r>
-            <a:endParaRPr lang="es-PE" sz="1600" dirty="0">
-              <a:latin typeface="+mn-lt"/>
-            </a:endParaRPr>
           </a:p>
         </p:txBody>
       </p:sp>
@@ -18722,9 +18626,6 @@
               </a:rPr>
               <a:t>Reglas de negocio</a:t>
             </a:r>
-            <a:endParaRPr lang="es-PE" sz="1600" dirty="0">
-              <a:latin typeface="+mn-lt"/>
-            </a:endParaRPr>
           </a:p>
           <a:p>
             <a:pPr marL="285750" indent="-285750" algn="just">
@@ -18741,9 +18642,6 @@
               </a:rPr>
               <a:t>Entidades de negocio</a:t>
             </a:r>
-            <a:endParaRPr lang="es-PE" sz="1600" dirty="0">
-              <a:latin typeface="+mn-lt"/>
-            </a:endParaRPr>
           </a:p>
           <a:p>
             <a:pPr marL="285750" indent="-285750" algn="just">
@@ -18760,9 +18658,6 @@
               </a:rPr>
               <a:t>Validaciones de datos</a:t>
             </a:r>
-            <a:endParaRPr lang="es-PE" sz="1600" dirty="0">
-              <a:latin typeface="+mn-lt"/>
-            </a:endParaRPr>
           </a:p>
           <a:p>
             <a:pPr marL="285750" indent="-285750" algn="just">
@@ -18779,9 +18674,6 @@
               </a:rPr>
               <a:t>Flujos y procesos</a:t>
             </a:r>
-            <a:endParaRPr lang="es-PE" sz="1600" dirty="0">
-              <a:latin typeface="+mn-lt"/>
-            </a:endParaRPr>
           </a:p>
           <a:p>
             <a:pPr marL="285750" indent="-285750" algn="just">
@@ -18826,13 +18718,7 @@
               <a:rPr lang="es-PE" sz="1600" b="1" dirty="0">
                 <a:latin typeface="+mn-lt"/>
               </a:rPr>
-              <a:t>Capa de </a:t>
-            </a:r>
-            <a:r>
-              <a:rPr lang="es-PE" sz="1600" b="1" dirty="0">
-                <a:latin typeface="+mn-lt"/>
-              </a:rPr>
-              <a:t>datos</a:t>
+              <a:t>Capa de datos</a:t>
             </a:r>
           </a:p>
           <a:p>
@@ -18848,13 +18734,7 @@
               <a:rPr lang="en-US" sz="1600" dirty="0">
                 <a:latin typeface="+mn-lt"/>
               </a:rPr>
-              <a:t>Microsoft </a:t>
-            </a:r>
-            <a:r>
-              <a:rPr lang="en-US" sz="1600" dirty="0">
-                <a:latin typeface="+mn-lt"/>
-              </a:rPr>
-              <a:t>SQL Server 2008 R2</a:t>
+              <a:t>Microsoft SQL Server 2008 R2</a:t>
             </a:r>
           </a:p>
           <a:p>
@@ -19317,9 +19197,9 @@
       </p:sp>
       <p:pic>
         <p:nvPicPr>
-          <p:cNvPr id="43010" name="1 Imagen"/>
+          <p:cNvPr id="43012" name="Picture 4"/>
           <p:cNvPicPr>
-            <a:picLocks noChangeAspect="1"/>
+            <a:picLocks noChangeAspect="1" noChangeArrowheads="1"/>
           </p:cNvPicPr>
           <p:nvPr/>
         </p:nvPicPr>
@@ -19332,8 +19212,8 @@
         </p:blipFill>
         <p:spPr bwMode="auto">
           <a:xfrm>
-            <a:off x="1476375" y="1590675"/>
-            <a:ext cx="6570663" cy="4773613"/>
+            <a:off x="1116013" y="1965325"/>
+            <a:ext cx="7416800" cy="4892675"/>
           </a:xfrm>
           <a:prstGeom prst="rect">
             <a:avLst/>
@@ -19345,6 +19225,7 @@
             <a:headEnd/>
             <a:tailEnd/>
           </a:ln>
+          <a:effectLst/>
         </p:spPr>
       </p:pic>
     </p:spTree>
@@ -19490,9 +19371,9 @@
       </p:sp>
       <p:pic>
         <p:nvPicPr>
-          <p:cNvPr id="45058" name="3 Imagen"/>
+          <p:cNvPr id="45060" name="Picture 4"/>
           <p:cNvPicPr>
-            <a:picLocks noChangeAspect="1"/>
+            <a:picLocks noChangeAspect="1" noChangeArrowheads="1"/>
           </p:cNvPicPr>
           <p:nvPr/>
         </p:nvPicPr>
@@ -19505,8 +19386,8 @@
         </p:blipFill>
         <p:spPr bwMode="auto">
           <a:xfrm>
-            <a:off x="1403350" y="1484313"/>
-            <a:ext cx="6264275" cy="5235575"/>
+            <a:off x="1547813" y="1665288"/>
+            <a:ext cx="6696075" cy="5038725"/>
           </a:xfrm>
           <a:prstGeom prst="rect">
             <a:avLst/>
@@ -19518,6 +19399,7 @@
             <a:headEnd/>
             <a:tailEnd/>
           </a:ln>
+          <a:effectLst/>
         </p:spPr>
       </p:pic>
     </p:spTree>
@@ -19864,7 +19746,7 @@
       </p:sp>
       <p:pic>
         <p:nvPicPr>
-          <p:cNvPr id="51204" name="Picture 4"/>
+          <p:cNvPr id="51202" name="Picture 4"/>
           <p:cNvPicPr>
             <a:picLocks noChangeAspect="1" noChangeArrowheads="1"/>
           </p:cNvPicPr>
@@ -19892,7 +19774,6 @@
             <a:headEnd/>
             <a:tailEnd/>
           </a:ln>
-          <a:effectLst/>
         </p:spPr>
       </p:pic>
     </p:spTree>
@@ -20252,7 +20133,7 @@
         </p:nvGraphicFramePr>
         <p:xfrm>
           <a:off x="250825" y="2060575"/>
-          <a:ext cx="8642350" cy="4464050"/>
+          <a:ext cx="8640763" cy="4464050"/>
         </p:xfrm>
         <a:graphic>
           <a:graphicData uri="http://schemas.openxmlformats.org/drawingml/2006/table">
@@ -20791,7 +20672,7 @@
         </p:nvGraphicFramePr>
         <p:xfrm>
           <a:off x="250825" y="2060575"/>
-          <a:ext cx="8642350" cy="4595813"/>
+          <a:ext cx="8640763" cy="4595813"/>
         </p:xfrm>
         <a:graphic>
           <a:graphicData uri="http://schemas.openxmlformats.org/drawingml/2006/table">
@@ -21333,7 +21214,7 @@
         </p:nvGraphicFramePr>
         <p:xfrm>
           <a:off x="250825" y="2060575"/>
-          <a:ext cx="8642350" cy="4383088"/>
+          <a:ext cx="8640763" cy="4383088"/>
         </p:xfrm>
         <a:graphic>
           <a:graphicData uri="http://schemas.openxmlformats.org/drawingml/2006/table">

</xml_diff>